<commit_message>
2018.1 Whats New Presentation
</commit_message>
<xml_diff>
--- a/docs/presentations/Sage300SDK_2018.1WebSDKOverview.pptx
+++ b/docs/presentations/Sage300SDK_2018.1WebSDKOverview.pptx
@@ -5,7 +5,7 @@
     <p:sldMasterId id="2147483660" r:id="rId1"/>
   </p:sldMasterIdLst>
   <p:notesMasterIdLst>
-    <p:notesMasterId r:id="rId11"/>
+    <p:notesMasterId r:id="rId19"/>
   </p:notesMasterIdLst>
   <p:sldIdLst>
     <p:sldId id="257" r:id="rId2"/>
@@ -13,10 +13,18 @@
     <p:sldId id="271" r:id="rId4"/>
     <p:sldId id="273" r:id="rId5"/>
     <p:sldId id="268" r:id="rId6"/>
-    <p:sldId id="279" r:id="rId7"/>
-    <p:sldId id="280" r:id="rId8"/>
-    <p:sldId id="281" r:id="rId9"/>
-    <p:sldId id="265" r:id="rId10"/>
+    <p:sldId id="282" r:id="rId7"/>
+    <p:sldId id="284" r:id="rId8"/>
+    <p:sldId id="285" r:id="rId9"/>
+    <p:sldId id="286" r:id="rId10"/>
+    <p:sldId id="287" r:id="rId11"/>
+    <p:sldId id="288" r:id="rId12"/>
+    <p:sldId id="279" r:id="rId13"/>
+    <p:sldId id="280" r:id="rId14"/>
+    <p:sldId id="281" r:id="rId15"/>
+    <p:sldId id="289" r:id="rId16"/>
+    <p:sldId id="290" r:id="rId17"/>
+    <p:sldId id="265" r:id="rId18"/>
   </p:sldIdLst>
   <p:sldSz cx="12192000" cy="6858000"/>
   <p:notesSz cx="6858000" cy="9144000"/>
@@ -209,7 +217,7 @@
           <a:p>
             <a:fld id="{F8DE098C-C2B2-472C-9728-F51906A9149D}" type="datetimeFigureOut">
               <a:rPr lang="en-US" smtClean="0"/>
-              <a:t>10/3/2017</a:t>
+              <a:t>11/15/2017</a:t>
             </a:fld>
             <a:endParaRPr lang="en-US"/>
           </a:p>
@@ -617,6 +625,993 @@
 </p:notes>
 </file>
 
+<file path=ppt/notesSlides/notesSlide10.xml><?xml version="1.0" encoding="utf-8"?>
+<p:notes xmlns:a="http://schemas.openxmlformats.org/drawingml/2006/main" xmlns:r="http://schemas.openxmlformats.org/officeDocument/2006/relationships" xmlns:p="http://schemas.openxmlformats.org/presentationml/2006/main">
+  <p:cSld>
+    <p:spTree>
+      <p:nvGrpSpPr>
+        <p:cNvPr id="1" name=""/>
+        <p:cNvGrpSpPr/>
+        <p:nvPr/>
+      </p:nvGrpSpPr>
+      <p:grpSpPr>
+        <a:xfrm>
+          <a:off x="0" y="0"/>
+          <a:ext cx="0" cy="0"/>
+          <a:chOff x="0" y="0"/>
+          <a:chExt cx="0" cy="0"/>
+        </a:xfrm>
+      </p:grpSpPr>
+      <p:sp>
+        <p:nvSpPr>
+          <p:cNvPr id="2" name="Slide Image Placeholder 1"/>
+          <p:cNvSpPr>
+            <a:spLocks noGrp="1" noRot="1" noChangeAspect="1"/>
+          </p:cNvSpPr>
+          <p:nvPr>
+            <p:ph type="sldImg"/>
+          </p:nvPr>
+        </p:nvSpPr>
+        <p:spPr/>
+      </p:sp>
+      <p:sp>
+        <p:nvSpPr>
+          <p:cNvPr id="3" name="Notes Placeholder 2"/>
+          <p:cNvSpPr>
+            <a:spLocks noGrp="1"/>
+          </p:cNvSpPr>
+          <p:nvPr>
+            <p:ph type="body" idx="1"/>
+          </p:nvPr>
+        </p:nvSpPr>
+        <p:spPr/>
+        <p:txBody>
+          <a:bodyPr/>
+          <a:lstStyle/>
+          <a:p>
+            <a:endParaRPr lang="en-US" dirty="0"/>
+          </a:p>
+          <a:p>
+            <a:endParaRPr lang="en-US" dirty="0"/>
+          </a:p>
+        </p:txBody>
+      </p:sp>
+      <p:sp>
+        <p:nvSpPr>
+          <p:cNvPr id="4" name="Slide Number Placeholder 3"/>
+          <p:cNvSpPr>
+            <a:spLocks noGrp="1"/>
+          </p:cNvSpPr>
+          <p:nvPr>
+            <p:ph type="sldNum" sz="quarter" idx="10"/>
+          </p:nvPr>
+        </p:nvSpPr>
+        <p:spPr/>
+        <p:txBody>
+          <a:bodyPr/>
+          <a:lstStyle/>
+          <a:p>
+            <a:pPr marL="0" marR="0" lvl="0" indent="0" defTabSz="914400" eaLnBrk="1" fontAlgn="auto" latinLnBrk="0" hangingPunct="1">
+              <a:lnSpc>
+                <a:spcPct val="100000"/>
+              </a:lnSpc>
+              <a:spcBef>
+                <a:spcPts val="0"/>
+              </a:spcBef>
+              <a:spcAft>
+                <a:spcPts val="0"/>
+              </a:spcAft>
+              <a:buClrTx/>
+              <a:buSzTx/>
+              <a:buFontTx/>
+              <a:buNone/>
+              <a:tabLst/>
+              <a:defRPr/>
+            </a:pPr>
+            <a:fld id="{AB69E77B-23F2-4D26-B3FA-6109AB5D8139}" type="slidenum">
+              <a:rPr kumimoji="0" lang="en-GB" sz="1800" b="0" i="0" u="none" strike="noStrike" kern="0" cap="none" spc="0" normalizeH="0" baseline="0" noProof="0" smtClean="0">
+                <a:ln>
+                  <a:noFill/>
+                </a:ln>
+                <a:solidFill>
+                  <a:prstClr val="black"/>
+                </a:solidFill>
+                <a:effectLst/>
+                <a:uLnTx/>
+                <a:uFillTx/>
+              </a:rPr>
+              <a:pPr marL="0" marR="0" lvl="0" indent="0" defTabSz="914400" eaLnBrk="1" fontAlgn="auto" latinLnBrk="0" hangingPunct="1">
+                <a:lnSpc>
+                  <a:spcPct val="100000"/>
+                </a:lnSpc>
+                <a:spcBef>
+                  <a:spcPts val="0"/>
+                </a:spcBef>
+                <a:spcAft>
+                  <a:spcPts val="0"/>
+                </a:spcAft>
+                <a:buClrTx/>
+                <a:buSzTx/>
+                <a:buFontTx/>
+                <a:buNone/>
+                <a:tabLst/>
+                <a:defRPr/>
+              </a:pPr>
+              <a:t>11</a:t>
+            </a:fld>
+            <a:endParaRPr kumimoji="0" lang="en-GB" sz="1800" b="0" i="0" u="none" strike="noStrike" kern="0" cap="none" spc="0" normalizeH="0" baseline="0" noProof="0">
+              <a:ln>
+                <a:noFill/>
+              </a:ln>
+              <a:solidFill>
+                <a:prstClr val="black"/>
+              </a:solidFill>
+              <a:effectLst/>
+              <a:uLnTx/>
+              <a:uFillTx/>
+            </a:endParaRPr>
+          </a:p>
+        </p:txBody>
+      </p:sp>
+    </p:spTree>
+    <p:extLst>
+      <p:ext uri="{BB962C8B-B14F-4D97-AF65-F5344CB8AC3E}">
+        <p14:creationId xmlns:p14="http://schemas.microsoft.com/office/powerpoint/2010/main" val="412695115"/>
+      </p:ext>
+    </p:extLst>
+  </p:cSld>
+  <p:clrMapOvr>
+    <a:masterClrMapping/>
+  </p:clrMapOvr>
+</p:notes>
+</file>
+
+<file path=ppt/notesSlides/notesSlide11.xml><?xml version="1.0" encoding="utf-8"?>
+<p:notes xmlns:a="http://schemas.openxmlformats.org/drawingml/2006/main" xmlns:r="http://schemas.openxmlformats.org/officeDocument/2006/relationships" xmlns:p="http://schemas.openxmlformats.org/presentationml/2006/main">
+  <p:cSld>
+    <p:spTree>
+      <p:nvGrpSpPr>
+        <p:cNvPr id="1" name=""/>
+        <p:cNvGrpSpPr/>
+        <p:nvPr/>
+      </p:nvGrpSpPr>
+      <p:grpSpPr>
+        <a:xfrm>
+          <a:off x="0" y="0"/>
+          <a:ext cx="0" cy="0"/>
+          <a:chOff x="0" y="0"/>
+          <a:chExt cx="0" cy="0"/>
+        </a:xfrm>
+      </p:grpSpPr>
+      <p:sp>
+        <p:nvSpPr>
+          <p:cNvPr id="2" name="Slide Image Placeholder 1"/>
+          <p:cNvSpPr>
+            <a:spLocks noGrp="1" noRot="1" noChangeAspect="1"/>
+          </p:cNvSpPr>
+          <p:nvPr>
+            <p:ph type="sldImg"/>
+          </p:nvPr>
+        </p:nvSpPr>
+        <p:spPr/>
+      </p:sp>
+      <p:sp>
+        <p:nvSpPr>
+          <p:cNvPr id="3" name="Notes Placeholder 2"/>
+          <p:cNvSpPr>
+            <a:spLocks noGrp="1"/>
+          </p:cNvSpPr>
+          <p:nvPr>
+            <p:ph type="body" idx="1"/>
+          </p:nvPr>
+        </p:nvSpPr>
+        <p:spPr/>
+        <p:txBody>
+          <a:bodyPr/>
+          <a:lstStyle/>
+          <a:p>
+            <a:endParaRPr lang="en-US" dirty="0"/>
+          </a:p>
+          <a:p>
+            <a:endParaRPr lang="en-US" dirty="0"/>
+          </a:p>
+        </p:txBody>
+      </p:sp>
+      <p:sp>
+        <p:nvSpPr>
+          <p:cNvPr id="4" name="Slide Number Placeholder 3"/>
+          <p:cNvSpPr>
+            <a:spLocks noGrp="1"/>
+          </p:cNvSpPr>
+          <p:nvPr>
+            <p:ph type="sldNum" sz="quarter" idx="10"/>
+          </p:nvPr>
+        </p:nvSpPr>
+        <p:spPr/>
+        <p:txBody>
+          <a:bodyPr/>
+          <a:lstStyle/>
+          <a:p>
+            <a:pPr marL="0" marR="0" lvl="0" indent="0" defTabSz="914400" eaLnBrk="1" fontAlgn="auto" latinLnBrk="0" hangingPunct="1">
+              <a:lnSpc>
+                <a:spcPct val="100000"/>
+              </a:lnSpc>
+              <a:spcBef>
+                <a:spcPts val="0"/>
+              </a:spcBef>
+              <a:spcAft>
+                <a:spcPts val="0"/>
+              </a:spcAft>
+              <a:buClrTx/>
+              <a:buSzTx/>
+              <a:buFontTx/>
+              <a:buNone/>
+              <a:tabLst/>
+              <a:defRPr/>
+            </a:pPr>
+            <a:fld id="{AB69E77B-23F2-4D26-B3FA-6109AB5D8139}" type="slidenum">
+              <a:rPr kumimoji="0" lang="en-GB" sz="1800" b="0" i="0" u="none" strike="noStrike" kern="0" cap="none" spc="0" normalizeH="0" baseline="0" noProof="0" smtClean="0">
+                <a:ln>
+                  <a:noFill/>
+                </a:ln>
+                <a:solidFill>
+                  <a:prstClr val="black"/>
+                </a:solidFill>
+                <a:effectLst/>
+                <a:uLnTx/>
+                <a:uFillTx/>
+              </a:rPr>
+              <a:pPr marL="0" marR="0" lvl="0" indent="0" defTabSz="914400" eaLnBrk="1" fontAlgn="auto" latinLnBrk="0" hangingPunct="1">
+                <a:lnSpc>
+                  <a:spcPct val="100000"/>
+                </a:lnSpc>
+                <a:spcBef>
+                  <a:spcPts val="0"/>
+                </a:spcBef>
+                <a:spcAft>
+                  <a:spcPts val="0"/>
+                </a:spcAft>
+                <a:buClrTx/>
+                <a:buSzTx/>
+                <a:buFontTx/>
+                <a:buNone/>
+                <a:tabLst/>
+                <a:defRPr/>
+              </a:pPr>
+              <a:t>12</a:t>
+            </a:fld>
+            <a:endParaRPr kumimoji="0" lang="en-GB" sz="1800" b="0" i="0" u="none" strike="noStrike" kern="0" cap="none" spc="0" normalizeH="0" baseline="0" noProof="0">
+              <a:ln>
+                <a:noFill/>
+              </a:ln>
+              <a:solidFill>
+                <a:prstClr val="black"/>
+              </a:solidFill>
+              <a:effectLst/>
+              <a:uLnTx/>
+              <a:uFillTx/>
+            </a:endParaRPr>
+          </a:p>
+        </p:txBody>
+      </p:sp>
+    </p:spTree>
+    <p:extLst>
+      <p:ext uri="{BB962C8B-B14F-4D97-AF65-F5344CB8AC3E}">
+        <p14:creationId xmlns:p14="http://schemas.microsoft.com/office/powerpoint/2010/main" val="958842670"/>
+      </p:ext>
+    </p:extLst>
+  </p:cSld>
+  <p:clrMapOvr>
+    <a:masterClrMapping/>
+  </p:clrMapOvr>
+</p:notes>
+</file>
+
+<file path=ppt/notesSlides/notesSlide12.xml><?xml version="1.0" encoding="utf-8"?>
+<p:notes xmlns:a="http://schemas.openxmlformats.org/drawingml/2006/main" xmlns:r="http://schemas.openxmlformats.org/officeDocument/2006/relationships" xmlns:p="http://schemas.openxmlformats.org/presentationml/2006/main">
+  <p:cSld>
+    <p:spTree>
+      <p:nvGrpSpPr>
+        <p:cNvPr id="1" name=""/>
+        <p:cNvGrpSpPr/>
+        <p:nvPr/>
+      </p:nvGrpSpPr>
+      <p:grpSpPr>
+        <a:xfrm>
+          <a:off x="0" y="0"/>
+          <a:ext cx="0" cy="0"/>
+          <a:chOff x="0" y="0"/>
+          <a:chExt cx="0" cy="0"/>
+        </a:xfrm>
+      </p:grpSpPr>
+      <p:sp>
+        <p:nvSpPr>
+          <p:cNvPr id="2" name="Slide Image Placeholder 1"/>
+          <p:cNvSpPr>
+            <a:spLocks noGrp="1" noRot="1" noChangeAspect="1"/>
+          </p:cNvSpPr>
+          <p:nvPr>
+            <p:ph type="sldImg"/>
+          </p:nvPr>
+        </p:nvSpPr>
+        <p:spPr/>
+      </p:sp>
+      <p:sp>
+        <p:nvSpPr>
+          <p:cNvPr id="3" name="Notes Placeholder 2"/>
+          <p:cNvSpPr>
+            <a:spLocks noGrp="1"/>
+          </p:cNvSpPr>
+          <p:nvPr>
+            <p:ph type="body" idx="1"/>
+          </p:nvPr>
+        </p:nvSpPr>
+        <p:spPr/>
+        <p:txBody>
+          <a:bodyPr/>
+          <a:lstStyle/>
+          <a:p>
+            <a:endParaRPr lang="en-US" dirty="0"/>
+          </a:p>
+          <a:p>
+            <a:endParaRPr lang="en-US" dirty="0"/>
+          </a:p>
+        </p:txBody>
+      </p:sp>
+      <p:sp>
+        <p:nvSpPr>
+          <p:cNvPr id="4" name="Slide Number Placeholder 3"/>
+          <p:cNvSpPr>
+            <a:spLocks noGrp="1"/>
+          </p:cNvSpPr>
+          <p:nvPr>
+            <p:ph type="sldNum" sz="quarter" idx="10"/>
+          </p:nvPr>
+        </p:nvSpPr>
+        <p:spPr/>
+        <p:txBody>
+          <a:bodyPr/>
+          <a:lstStyle/>
+          <a:p>
+            <a:pPr marL="0" marR="0" lvl="0" indent="0" defTabSz="914400" eaLnBrk="1" fontAlgn="auto" latinLnBrk="0" hangingPunct="1">
+              <a:lnSpc>
+                <a:spcPct val="100000"/>
+              </a:lnSpc>
+              <a:spcBef>
+                <a:spcPts val="0"/>
+              </a:spcBef>
+              <a:spcAft>
+                <a:spcPts val="0"/>
+              </a:spcAft>
+              <a:buClrTx/>
+              <a:buSzTx/>
+              <a:buFontTx/>
+              <a:buNone/>
+              <a:tabLst/>
+              <a:defRPr/>
+            </a:pPr>
+            <a:fld id="{AB69E77B-23F2-4D26-B3FA-6109AB5D8139}" type="slidenum">
+              <a:rPr kumimoji="0" lang="en-GB" sz="1800" b="0" i="0" u="none" strike="noStrike" kern="0" cap="none" spc="0" normalizeH="0" baseline="0" noProof="0" smtClean="0">
+                <a:ln>
+                  <a:noFill/>
+                </a:ln>
+                <a:solidFill>
+                  <a:prstClr val="black"/>
+                </a:solidFill>
+                <a:effectLst/>
+                <a:uLnTx/>
+                <a:uFillTx/>
+              </a:rPr>
+              <a:pPr marL="0" marR="0" lvl="0" indent="0" defTabSz="914400" eaLnBrk="1" fontAlgn="auto" latinLnBrk="0" hangingPunct="1">
+                <a:lnSpc>
+                  <a:spcPct val="100000"/>
+                </a:lnSpc>
+                <a:spcBef>
+                  <a:spcPts val="0"/>
+                </a:spcBef>
+                <a:spcAft>
+                  <a:spcPts val="0"/>
+                </a:spcAft>
+                <a:buClrTx/>
+                <a:buSzTx/>
+                <a:buFontTx/>
+                <a:buNone/>
+                <a:tabLst/>
+                <a:defRPr/>
+              </a:pPr>
+              <a:t>13</a:t>
+            </a:fld>
+            <a:endParaRPr kumimoji="0" lang="en-GB" sz="1800" b="0" i="0" u="none" strike="noStrike" kern="0" cap="none" spc="0" normalizeH="0" baseline="0" noProof="0">
+              <a:ln>
+                <a:noFill/>
+              </a:ln>
+              <a:solidFill>
+                <a:prstClr val="black"/>
+              </a:solidFill>
+              <a:effectLst/>
+              <a:uLnTx/>
+              <a:uFillTx/>
+            </a:endParaRPr>
+          </a:p>
+        </p:txBody>
+      </p:sp>
+    </p:spTree>
+    <p:extLst>
+      <p:ext uri="{BB962C8B-B14F-4D97-AF65-F5344CB8AC3E}">
+        <p14:creationId xmlns:p14="http://schemas.microsoft.com/office/powerpoint/2010/main" val="2372413884"/>
+      </p:ext>
+    </p:extLst>
+  </p:cSld>
+  <p:clrMapOvr>
+    <a:masterClrMapping/>
+  </p:clrMapOvr>
+</p:notes>
+</file>
+
+<file path=ppt/notesSlides/notesSlide13.xml><?xml version="1.0" encoding="utf-8"?>
+<p:notes xmlns:a="http://schemas.openxmlformats.org/drawingml/2006/main" xmlns:r="http://schemas.openxmlformats.org/officeDocument/2006/relationships" xmlns:p="http://schemas.openxmlformats.org/presentationml/2006/main">
+  <p:cSld>
+    <p:spTree>
+      <p:nvGrpSpPr>
+        <p:cNvPr id="1" name=""/>
+        <p:cNvGrpSpPr/>
+        <p:nvPr/>
+      </p:nvGrpSpPr>
+      <p:grpSpPr>
+        <a:xfrm>
+          <a:off x="0" y="0"/>
+          <a:ext cx="0" cy="0"/>
+          <a:chOff x="0" y="0"/>
+          <a:chExt cx="0" cy="0"/>
+        </a:xfrm>
+      </p:grpSpPr>
+      <p:sp>
+        <p:nvSpPr>
+          <p:cNvPr id="2" name="Slide Image Placeholder 1"/>
+          <p:cNvSpPr>
+            <a:spLocks noGrp="1" noRot="1" noChangeAspect="1"/>
+          </p:cNvSpPr>
+          <p:nvPr>
+            <p:ph type="sldImg"/>
+          </p:nvPr>
+        </p:nvSpPr>
+        <p:spPr/>
+      </p:sp>
+      <p:sp>
+        <p:nvSpPr>
+          <p:cNvPr id="3" name="Notes Placeholder 2"/>
+          <p:cNvSpPr>
+            <a:spLocks noGrp="1"/>
+          </p:cNvSpPr>
+          <p:nvPr>
+            <p:ph type="body" idx="1"/>
+          </p:nvPr>
+        </p:nvSpPr>
+        <p:spPr/>
+        <p:txBody>
+          <a:bodyPr/>
+          <a:lstStyle/>
+          <a:p>
+            <a:endParaRPr lang="en-US" dirty="0"/>
+          </a:p>
+          <a:p>
+            <a:endParaRPr lang="en-US" dirty="0"/>
+          </a:p>
+        </p:txBody>
+      </p:sp>
+      <p:sp>
+        <p:nvSpPr>
+          <p:cNvPr id="4" name="Slide Number Placeholder 3"/>
+          <p:cNvSpPr>
+            <a:spLocks noGrp="1"/>
+          </p:cNvSpPr>
+          <p:nvPr>
+            <p:ph type="sldNum" sz="quarter" idx="10"/>
+          </p:nvPr>
+        </p:nvSpPr>
+        <p:spPr/>
+        <p:txBody>
+          <a:bodyPr/>
+          <a:lstStyle/>
+          <a:p>
+            <a:pPr marL="0" marR="0" lvl="0" indent="0" defTabSz="914400" eaLnBrk="1" fontAlgn="auto" latinLnBrk="0" hangingPunct="1">
+              <a:lnSpc>
+                <a:spcPct val="100000"/>
+              </a:lnSpc>
+              <a:spcBef>
+                <a:spcPts val="0"/>
+              </a:spcBef>
+              <a:spcAft>
+                <a:spcPts val="0"/>
+              </a:spcAft>
+              <a:buClrTx/>
+              <a:buSzTx/>
+              <a:buFontTx/>
+              <a:buNone/>
+              <a:tabLst/>
+              <a:defRPr/>
+            </a:pPr>
+            <a:fld id="{AB69E77B-23F2-4D26-B3FA-6109AB5D8139}" type="slidenum">
+              <a:rPr kumimoji="0" lang="en-GB" sz="1800" b="0" i="0" u="none" strike="noStrike" kern="0" cap="none" spc="0" normalizeH="0" baseline="0" noProof="0" smtClean="0">
+                <a:ln>
+                  <a:noFill/>
+                </a:ln>
+                <a:solidFill>
+                  <a:prstClr val="black"/>
+                </a:solidFill>
+                <a:effectLst/>
+                <a:uLnTx/>
+                <a:uFillTx/>
+              </a:rPr>
+              <a:pPr marL="0" marR="0" lvl="0" indent="0" defTabSz="914400" eaLnBrk="1" fontAlgn="auto" latinLnBrk="0" hangingPunct="1">
+                <a:lnSpc>
+                  <a:spcPct val="100000"/>
+                </a:lnSpc>
+                <a:spcBef>
+                  <a:spcPts val="0"/>
+                </a:spcBef>
+                <a:spcAft>
+                  <a:spcPts val="0"/>
+                </a:spcAft>
+                <a:buClrTx/>
+                <a:buSzTx/>
+                <a:buFontTx/>
+                <a:buNone/>
+                <a:tabLst/>
+                <a:defRPr/>
+              </a:pPr>
+              <a:t>14</a:t>
+            </a:fld>
+            <a:endParaRPr kumimoji="0" lang="en-GB" sz="1800" b="0" i="0" u="none" strike="noStrike" kern="0" cap="none" spc="0" normalizeH="0" baseline="0" noProof="0">
+              <a:ln>
+                <a:noFill/>
+              </a:ln>
+              <a:solidFill>
+                <a:prstClr val="black"/>
+              </a:solidFill>
+              <a:effectLst/>
+              <a:uLnTx/>
+              <a:uFillTx/>
+            </a:endParaRPr>
+          </a:p>
+        </p:txBody>
+      </p:sp>
+    </p:spTree>
+    <p:extLst>
+      <p:ext uri="{BB962C8B-B14F-4D97-AF65-F5344CB8AC3E}">
+        <p14:creationId xmlns:p14="http://schemas.microsoft.com/office/powerpoint/2010/main" val="1964575975"/>
+      </p:ext>
+    </p:extLst>
+  </p:cSld>
+  <p:clrMapOvr>
+    <a:masterClrMapping/>
+  </p:clrMapOvr>
+</p:notes>
+</file>
+
+<file path=ppt/notesSlides/notesSlide14.xml><?xml version="1.0" encoding="utf-8"?>
+<p:notes xmlns:a="http://schemas.openxmlformats.org/drawingml/2006/main" xmlns:r="http://schemas.openxmlformats.org/officeDocument/2006/relationships" xmlns:p="http://schemas.openxmlformats.org/presentationml/2006/main">
+  <p:cSld>
+    <p:spTree>
+      <p:nvGrpSpPr>
+        <p:cNvPr id="1" name=""/>
+        <p:cNvGrpSpPr/>
+        <p:nvPr/>
+      </p:nvGrpSpPr>
+      <p:grpSpPr>
+        <a:xfrm>
+          <a:off x="0" y="0"/>
+          <a:ext cx="0" cy="0"/>
+          <a:chOff x="0" y="0"/>
+          <a:chExt cx="0" cy="0"/>
+        </a:xfrm>
+      </p:grpSpPr>
+      <p:sp>
+        <p:nvSpPr>
+          <p:cNvPr id="2" name="Slide Image Placeholder 1"/>
+          <p:cNvSpPr>
+            <a:spLocks noGrp="1" noRot="1" noChangeAspect="1"/>
+          </p:cNvSpPr>
+          <p:nvPr>
+            <p:ph type="sldImg"/>
+          </p:nvPr>
+        </p:nvSpPr>
+        <p:spPr/>
+      </p:sp>
+      <p:sp>
+        <p:nvSpPr>
+          <p:cNvPr id="3" name="Notes Placeholder 2"/>
+          <p:cNvSpPr>
+            <a:spLocks noGrp="1"/>
+          </p:cNvSpPr>
+          <p:nvPr>
+            <p:ph type="body" idx="1"/>
+          </p:nvPr>
+        </p:nvSpPr>
+        <p:spPr/>
+        <p:txBody>
+          <a:bodyPr/>
+          <a:lstStyle/>
+          <a:p>
+            <a:endParaRPr lang="en-US" dirty="0"/>
+          </a:p>
+          <a:p>
+            <a:endParaRPr lang="en-US" dirty="0"/>
+          </a:p>
+        </p:txBody>
+      </p:sp>
+      <p:sp>
+        <p:nvSpPr>
+          <p:cNvPr id="4" name="Slide Number Placeholder 3"/>
+          <p:cNvSpPr>
+            <a:spLocks noGrp="1"/>
+          </p:cNvSpPr>
+          <p:nvPr>
+            <p:ph type="sldNum" sz="quarter" idx="10"/>
+          </p:nvPr>
+        </p:nvSpPr>
+        <p:spPr/>
+        <p:txBody>
+          <a:bodyPr/>
+          <a:lstStyle/>
+          <a:p>
+            <a:pPr marL="0" marR="0" lvl="0" indent="0" defTabSz="914400" eaLnBrk="1" fontAlgn="auto" latinLnBrk="0" hangingPunct="1">
+              <a:lnSpc>
+                <a:spcPct val="100000"/>
+              </a:lnSpc>
+              <a:spcBef>
+                <a:spcPts val="0"/>
+              </a:spcBef>
+              <a:spcAft>
+                <a:spcPts val="0"/>
+              </a:spcAft>
+              <a:buClrTx/>
+              <a:buSzTx/>
+              <a:buFontTx/>
+              <a:buNone/>
+              <a:tabLst/>
+              <a:defRPr/>
+            </a:pPr>
+            <a:fld id="{AB69E77B-23F2-4D26-B3FA-6109AB5D8139}" type="slidenum">
+              <a:rPr kumimoji="0" lang="en-GB" sz="1800" b="0" i="0" u="none" strike="noStrike" kern="0" cap="none" spc="0" normalizeH="0" baseline="0" noProof="0" smtClean="0">
+                <a:ln>
+                  <a:noFill/>
+                </a:ln>
+                <a:solidFill>
+                  <a:prstClr val="black"/>
+                </a:solidFill>
+                <a:effectLst/>
+                <a:uLnTx/>
+                <a:uFillTx/>
+              </a:rPr>
+              <a:pPr marL="0" marR="0" lvl="0" indent="0" defTabSz="914400" eaLnBrk="1" fontAlgn="auto" latinLnBrk="0" hangingPunct="1">
+                <a:lnSpc>
+                  <a:spcPct val="100000"/>
+                </a:lnSpc>
+                <a:spcBef>
+                  <a:spcPts val="0"/>
+                </a:spcBef>
+                <a:spcAft>
+                  <a:spcPts val="0"/>
+                </a:spcAft>
+                <a:buClrTx/>
+                <a:buSzTx/>
+                <a:buFontTx/>
+                <a:buNone/>
+                <a:tabLst/>
+                <a:defRPr/>
+              </a:pPr>
+              <a:t>15</a:t>
+            </a:fld>
+            <a:endParaRPr kumimoji="0" lang="en-GB" sz="1800" b="0" i="0" u="none" strike="noStrike" kern="0" cap="none" spc="0" normalizeH="0" baseline="0" noProof="0">
+              <a:ln>
+                <a:noFill/>
+              </a:ln>
+              <a:solidFill>
+                <a:prstClr val="black"/>
+              </a:solidFill>
+              <a:effectLst/>
+              <a:uLnTx/>
+              <a:uFillTx/>
+            </a:endParaRPr>
+          </a:p>
+        </p:txBody>
+      </p:sp>
+    </p:spTree>
+    <p:extLst>
+      <p:ext uri="{BB962C8B-B14F-4D97-AF65-F5344CB8AC3E}">
+        <p14:creationId xmlns:p14="http://schemas.microsoft.com/office/powerpoint/2010/main" val="2357487637"/>
+      </p:ext>
+    </p:extLst>
+  </p:cSld>
+  <p:clrMapOvr>
+    <a:masterClrMapping/>
+  </p:clrMapOvr>
+</p:notes>
+</file>
+
+<file path=ppt/notesSlides/notesSlide15.xml><?xml version="1.0" encoding="utf-8"?>
+<p:notes xmlns:a="http://schemas.openxmlformats.org/drawingml/2006/main" xmlns:r="http://schemas.openxmlformats.org/officeDocument/2006/relationships" xmlns:p="http://schemas.openxmlformats.org/presentationml/2006/main">
+  <p:cSld>
+    <p:spTree>
+      <p:nvGrpSpPr>
+        <p:cNvPr id="1" name=""/>
+        <p:cNvGrpSpPr/>
+        <p:nvPr/>
+      </p:nvGrpSpPr>
+      <p:grpSpPr>
+        <a:xfrm>
+          <a:off x="0" y="0"/>
+          <a:ext cx="0" cy="0"/>
+          <a:chOff x="0" y="0"/>
+          <a:chExt cx="0" cy="0"/>
+        </a:xfrm>
+      </p:grpSpPr>
+      <p:sp>
+        <p:nvSpPr>
+          <p:cNvPr id="2" name="Slide Image Placeholder 1"/>
+          <p:cNvSpPr>
+            <a:spLocks noGrp="1" noRot="1" noChangeAspect="1"/>
+          </p:cNvSpPr>
+          <p:nvPr>
+            <p:ph type="sldImg"/>
+          </p:nvPr>
+        </p:nvSpPr>
+        <p:spPr/>
+      </p:sp>
+      <p:sp>
+        <p:nvSpPr>
+          <p:cNvPr id="3" name="Notes Placeholder 2"/>
+          <p:cNvSpPr>
+            <a:spLocks noGrp="1"/>
+          </p:cNvSpPr>
+          <p:nvPr>
+            <p:ph type="body" idx="1"/>
+          </p:nvPr>
+        </p:nvSpPr>
+        <p:spPr/>
+        <p:txBody>
+          <a:bodyPr/>
+          <a:lstStyle/>
+          <a:p>
+            <a:endParaRPr lang="en-US" dirty="0"/>
+          </a:p>
+          <a:p>
+            <a:endParaRPr lang="en-US" dirty="0"/>
+          </a:p>
+        </p:txBody>
+      </p:sp>
+      <p:sp>
+        <p:nvSpPr>
+          <p:cNvPr id="4" name="Slide Number Placeholder 3"/>
+          <p:cNvSpPr>
+            <a:spLocks noGrp="1"/>
+          </p:cNvSpPr>
+          <p:nvPr>
+            <p:ph type="sldNum" sz="quarter" idx="10"/>
+          </p:nvPr>
+        </p:nvSpPr>
+        <p:spPr/>
+        <p:txBody>
+          <a:bodyPr/>
+          <a:lstStyle/>
+          <a:p>
+            <a:pPr marL="0" marR="0" lvl="0" indent="0" defTabSz="914400" eaLnBrk="1" fontAlgn="auto" latinLnBrk="0" hangingPunct="1">
+              <a:lnSpc>
+                <a:spcPct val="100000"/>
+              </a:lnSpc>
+              <a:spcBef>
+                <a:spcPts val="0"/>
+              </a:spcBef>
+              <a:spcAft>
+                <a:spcPts val="0"/>
+              </a:spcAft>
+              <a:buClrTx/>
+              <a:buSzTx/>
+              <a:buFontTx/>
+              <a:buNone/>
+              <a:tabLst/>
+              <a:defRPr/>
+            </a:pPr>
+            <a:fld id="{AB69E77B-23F2-4D26-B3FA-6109AB5D8139}" type="slidenum">
+              <a:rPr kumimoji="0" lang="en-GB" sz="1800" b="0" i="0" u="none" strike="noStrike" kern="0" cap="none" spc="0" normalizeH="0" baseline="0" noProof="0" smtClean="0">
+                <a:ln>
+                  <a:noFill/>
+                </a:ln>
+                <a:solidFill>
+                  <a:prstClr val="black"/>
+                </a:solidFill>
+                <a:effectLst/>
+                <a:uLnTx/>
+                <a:uFillTx/>
+              </a:rPr>
+              <a:pPr marL="0" marR="0" lvl="0" indent="0" defTabSz="914400" eaLnBrk="1" fontAlgn="auto" latinLnBrk="0" hangingPunct="1">
+                <a:lnSpc>
+                  <a:spcPct val="100000"/>
+                </a:lnSpc>
+                <a:spcBef>
+                  <a:spcPts val="0"/>
+                </a:spcBef>
+                <a:spcAft>
+                  <a:spcPts val="0"/>
+                </a:spcAft>
+                <a:buClrTx/>
+                <a:buSzTx/>
+                <a:buFontTx/>
+                <a:buNone/>
+                <a:tabLst/>
+                <a:defRPr/>
+              </a:pPr>
+              <a:t>16</a:t>
+            </a:fld>
+            <a:endParaRPr kumimoji="0" lang="en-GB" sz="1800" b="0" i="0" u="none" strike="noStrike" kern="0" cap="none" spc="0" normalizeH="0" baseline="0" noProof="0">
+              <a:ln>
+                <a:noFill/>
+              </a:ln>
+              <a:solidFill>
+                <a:prstClr val="black"/>
+              </a:solidFill>
+              <a:effectLst/>
+              <a:uLnTx/>
+              <a:uFillTx/>
+            </a:endParaRPr>
+          </a:p>
+        </p:txBody>
+      </p:sp>
+    </p:spTree>
+    <p:extLst>
+      <p:ext uri="{BB962C8B-B14F-4D97-AF65-F5344CB8AC3E}">
+        <p14:creationId xmlns:p14="http://schemas.microsoft.com/office/powerpoint/2010/main" val="1183915067"/>
+      </p:ext>
+    </p:extLst>
+  </p:cSld>
+  <p:clrMapOvr>
+    <a:masterClrMapping/>
+  </p:clrMapOvr>
+</p:notes>
+</file>
+
+<file path=ppt/notesSlides/notesSlide16.xml><?xml version="1.0" encoding="utf-8"?>
+<p:notes xmlns:a="http://schemas.openxmlformats.org/drawingml/2006/main" xmlns:r="http://schemas.openxmlformats.org/officeDocument/2006/relationships" xmlns:p="http://schemas.openxmlformats.org/presentationml/2006/main">
+  <p:cSld>
+    <p:spTree>
+      <p:nvGrpSpPr>
+        <p:cNvPr id="1" name=""/>
+        <p:cNvGrpSpPr/>
+        <p:nvPr/>
+      </p:nvGrpSpPr>
+      <p:grpSpPr>
+        <a:xfrm>
+          <a:off x="0" y="0"/>
+          <a:ext cx="0" cy="0"/>
+          <a:chOff x="0" y="0"/>
+          <a:chExt cx="0" cy="0"/>
+        </a:xfrm>
+      </p:grpSpPr>
+      <p:sp>
+        <p:nvSpPr>
+          <p:cNvPr id="2" name="Slide Image Placeholder 1"/>
+          <p:cNvSpPr>
+            <a:spLocks noGrp="1" noRot="1" noChangeAspect="1"/>
+          </p:cNvSpPr>
+          <p:nvPr>
+            <p:ph type="sldImg"/>
+          </p:nvPr>
+        </p:nvSpPr>
+        <p:spPr/>
+      </p:sp>
+      <p:sp>
+        <p:nvSpPr>
+          <p:cNvPr id="3" name="Notes Placeholder 2"/>
+          <p:cNvSpPr>
+            <a:spLocks noGrp="1"/>
+          </p:cNvSpPr>
+          <p:nvPr>
+            <p:ph type="body" idx="1"/>
+          </p:nvPr>
+        </p:nvSpPr>
+        <p:spPr/>
+        <p:txBody>
+          <a:bodyPr/>
+          <a:lstStyle/>
+          <a:p>
+            <a:endParaRPr lang="en-US" dirty="0"/>
+          </a:p>
+          <a:p>
+            <a:endParaRPr lang="en-US" dirty="0"/>
+          </a:p>
+        </p:txBody>
+      </p:sp>
+      <p:sp>
+        <p:nvSpPr>
+          <p:cNvPr id="4" name="Slide Number Placeholder 3"/>
+          <p:cNvSpPr>
+            <a:spLocks noGrp="1"/>
+          </p:cNvSpPr>
+          <p:nvPr>
+            <p:ph type="sldNum" sz="quarter" idx="10"/>
+          </p:nvPr>
+        </p:nvSpPr>
+        <p:spPr/>
+        <p:txBody>
+          <a:bodyPr/>
+          <a:lstStyle/>
+          <a:p>
+            <a:pPr marL="0" marR="0" lvl="0" indent="0" defTabSz="914400" eaLnBrk="1" fontAlgn="auto" latinLnBrk="0" hangingPunct="1">
+              <a:lnSpc>
+                <a:spcPct val="100000"/>
+              </a:lnSpc>
+              <a:spcBef>
+                <a:spcPts val="0"/>
+              </a:spcBef>
+              <a:spcAft>
+                <a:spcPts val="0"/>
+              </a:spcAft>
+              <a:buClrTx/>
+              <a:buSzTx/>
+              <a:buFontTx/>
+              <a:buNone/>
+              <a:tabLst/>
+              <a:defRPr/>
+            </a:pPr>
+            <a:fld id="{AB69E77B-23F2-4D26-B3FA-6109AB5D8139}" type="slidenum">
+              <a:rPr kumimoji="0" lang="en-GB" sz="1800" b="0" i="0" u="none" strike="noStrike" kern="0" cap="none" spc="0" normalizeH="0" baseline="0" noProof="0" smtClean="0">
+                <a:ln>
+                  <a:noFill/>
+                </a:ln>
+                <a:solidFill>
+                  <a:prstClr val="black"/>
+                </a:solidFill>
+                <a:effectLst/>
+                <a:uLnTx/>
+                <a:uFillTx/>
+              </a:rPr>
+              <a:pPr marL="0" marR="0" lvl="0" indent="0" defTabSz="914400" eaLnBrk="1" fontAlgn="auto" latinLnBrk="0" hangingPunct="1">
+                <a:lnSpc>
+                  <a:spcPct val="100000"/>
+                </a:lnSpc>
+                <a:spcBef>
+                  <a:spcPts val="0"/>
+                </a:spcBef>
+                <a:spcAft>
+                  <a:spcPts val="0"/>
+                </a:spcAft>
+                <a:buClrTx/>
+                <a:buSzTx/>
+                <a:buFontTx/>
+                <a:buNone/>
+                <a:tabLst/>
+                <a:defRPr/>
+              </a:pPr>
+              <a:t>17</a:t>
+            </a:fld>
+            <a:endParaRPr kumimoji="0" lang="en-GB" sz="1800" b="0" i="0" u="none" strike="noStrike" kern="0" cap="none" spc="0" normalizeH="0" baseline="0" noProof="0">
+              <a:ln>
+                <a:noFill/>
+              </a:ln>
+              <a:solidFill>
+                <a:prstClr val="black"/>
+              </a:solidFill>
+              <a:effectLst/>
+              <a:uLnTx/>
+              <a:uFillTx/>
+            </a:endParaRPr>
+          </a:p>
+        </p:txBody>
+      </p:sp>
+    </p:spTree>
+    <p:extLst>
+      <p:ext uri="{BB962C8B-B14F-4D97-AF65-F5344CB8AC3E}">
+        <p14:creationId xmlns:p14="http://schemas.microsoft.com/office/powerpoint/2010/main" val="250796128"/>
+      </p:ext>
+    </p:extLst>
+  </p:cSld>
+  <p:clrMapOvr>
+    <a:masterClrMapping/>
+  </p:clrMapOvr>
+</p:notes>
+</file>
+
 <file path=ppt/notesSlides/notesSlide2.xml><?xml version="1.0" encoding="utf-8"?>
 <p:notes xmlns:a="http://schemas.openxmlformats.org/drawingml/2006/main" xmlns:r="http://schemas.openxmlformats.org/officeDocument/2006/relationships" xmlns:p="http://schemas.openxmlformats.org/presentationml/2006/main">
   <p:cSld>
@@ -1171,7 +2166,7 @@
     </p:spTree>
     <p:extLst>
       <p:ext uri="{BB962C8B-B14F-4D97-AF65-F5344CB8AC3E}">
-        <p14:creationId xmlns:p14="http://schemas.microsoft.com/office/powerpoint/2010/main" val="958842670"/>
+        <p14:creationId xmlns:p14="http://schemas.microsoft.com/office/powerpoint/2010/main" val="576520345"/>
       </p:ext>
     </p:extLst>
   </p:cSld>
@@ -1312,7 +2307,7 @@
     </p:spTree>
     <p:extLst>
       <p:ext uri="{BB962C8B-B14F-4D97-AF65-F5344CB8AC3E}">
-        <p14:creationId xmlns:p14="http://schemas.microsoft.com/office/powerpoint/2010/main" val="2372413884"/>
+        <p14:creationId xmlns:p14="http://schemas.microsoft.com/office/powerpoint/2010/main" val="94574049"/>
       </p:ext>
     </p:extLst>
   </p:cSld>
@@ -1453,7 +2448,7 @@
     </p:spTree>
     <p:extLst>
       <p:ext uri="{BB962C8B-B14F-4D97-AF65-F5344CB8AC3E}">
-        <p14:creationId xmlns:p14="http://schemas.microsoft.com/office/powerpoint/2010/main" val="1964575975"/>
+        <p14:creationId xmlns:p14="http://schemas.microsoft.com/office/powerpoint/2010/main" val="3688564425"/>
       </p:ext>
     </p:extLst>
   </p:cSld>
@@ -1594,7 +2589,148 @@
     </p:spTree>
     <p:extLst>
       <p:ext uri="{BB962C8B-B14F-4D97-AF65-F5344CB8AC3E}">
-        <p14:creationId xmlns:p14="http://schemas.microsoft.com/office/powerpoint/2010/main" val="250796128"/>
+        <p14:creationId xmlns:p14="http://schemas.microsoft.com/office/powerpoint/2010/main" val="2392139007"/>
+      </p:ext>
+    </p:extLst>
+  </p:cSld>
+  <p:clrMapOvr>
+    <a:masterClrMapping/>
+  </p:clrMapOvr>
+</p:notes>
+</file>
+
+<file path=ppt/notesSlides/notesSlide9.xml><?xml version="1.0" encoding="utf-8"?>
+<p:notes xmlns:a="http://schemas.openxmlformats.org/drawingml/2006/main" xmlns:r="http://schemas.openxmlformats.org/officeDocument/2006/relationships" xmlns:p="http://schemas.openxmlformats.org/presentationml/2006/main">
+  <p:cSld>
+    <p:spTree>
+      <p:nvGrpSpPr>
+        <p:cNvPr id="1" name=""/>
+        <p:cNvGrpSpPr/>
+        <p:nvPr/>
+      </p:nvGrpSpPr>
+      <p:grpSpPr>
+        <a:xfrm>
+          <a:off x="0" y="0"/>
+          <a:ext cx="0" cy="0"/>
+          <a:chOff x="0" y="0"/>
+          <a:chExt cx="0" cy="0"/>
+        </a:xfrm>
+      </p:grpSpPr>
+      <p:sp>
+        <p:nvSpPr>
+          <p:cNvPr id="2" name="Slide Image Placeholder 1"/>
+          <p:cNvSpPr>
+            <a:spLocks noGrp="1" noRot="1" noChangeAspect="1"/>
+          </p:cNvSpPr>
+          <p:nvPr>
+            <p:ph type="sldImg"/>
+          </p:nvPr>
+        </p:nvSpPr>
+        <p:spPr/>
+      </p:sp>
+      <p:sp>
+        <p:nvSpPr>
+          <p:cNvPr id="3" name="Notes Placeholder 2"/>
+          <p:cNvSpPr>
+            <a:spLocks noGrp="1"/>
+          </p:cNvSpPr>
+          <p:nvPr>
+            <p:ph type="body" idx="1"/>
+          </p:nvPr>
+        </p:nvSpPr>
+        <p:spPr/>
+        <p:txBody>
+          <a:bodyPr/>
+          <a:lstStyle/>
+          <a:p>
+            <a:endParaRPr lang="en-US" dirty="0"/>
+          </a:p>
+          <a:p>
+            <a:endParaRPr lang="en-US" dirty="0"/>
+          </a:p>
+        </p:txBody>
+      </p:sp>
+      <p:sp>
+        <p:nvSpPr>
+          <p:cNvPr id="4" name="Slide Number Placeholder 3"/>
+          <p:cNvSpPr>
+            <a:spLocks noGrp="1"/>
+          </p:cNvSpPr>
+          <p:nvPr>
+            <p:ph type="sldNum" sz="quarter" idx="10"/>
+          </p:nvPr>
+        </p:nvSpPr>
+        <p:spPr/>
+        <p:txBody>
+          <a:bodyPr/>
+          <a:lstStyle/>
+          <a:p>
+            <a:pPr marL="0" marR="0" lvl="0" indent="0" defTabSz="914400" eaLnBrk="1" fontAlgn="auto" latinLnBrk="0" hangingPunct="1">
+              <a:lnSpc>
+                <a:spcPct val="100000"/>
+              </a:lnSpc>
+              <a:spcBef>
+                <a:spcPts val="0"/>
+              </a:spcBef>
+              <a:spcAft>
+                <a:spcPts val="0"/>
+              </a:spcAft>
+              <a:buClrTx/>
+              <a:buSzTx/>
+              <a:buFontTx/>
+              <a:buNone/>
+              <a:tabLst/>
+              <a:defRPr/>
+            </a:pPr>
+            <a:fld id="{AB69E77B-23F2-4D26-B3FA-6109AB5D8139}" type="slidenum">
+              <a:rPr kumimoji="0" lang="en-GB" sz="1800" b="0" i="0" u="none" strike="noStrike" kern="0" cap="none" spc="0" normalizeH="0" baseline="0" noProof="0" smtClean="0">
+                <a:ln>
+                  <a:noFill/>
+                </a:ln>
+                <a:solidFill>
+                  <a:prstClr val="black"/>
+                </a:solidFill>
+                <a:effectLst/>
+                <a:uLnTx/>
+                <a:uFillTx/>
+              </a:rPr>
+              <a:pPr marL="0" marR="0" lvl="0" indent="0" defTabSz="914400" eaLnBrk="1" fontAlgn="auto" latinLnBrk="0" hangingPunct="1">
+                <a:lnSpc>
+                  <a:spcPct val="100000"/>
+                </a:lnSpc>
+                <a:spcBef>
+                  <a:spcPts val="0"/>
+                </a:spcBef>
+                <a:spcAft>
+                  <a:spcPts val="0"/>
+                </a:spcAft>
+                <a:buClrTx/>
+                <a:buSzTx/>
+                <a:buFontTx/>
+                <a:buNone/>
+                <a:tabLst/>
+                <a:defRPr/>
+              </a:pPr>
+              <a:t>10</a:t>
+            </a:fld>
+            <a:endParaRPr kumimoji="0" lang="en-GB" sz="1800" b="0" i="0" u="none" strike="noStrike" kern="0" cap="none" spc="0" normalizeH="0" baseline="0" noProof="0">
+              <a:ln>
+                <a:noFill/>
+              </a:ln>
+              <a:solidFill>
+                <a:prstClr val="black"/>
+              </a:solidFill>
+              <a:effectLst/>
+              <a:uLnTx/>
+              <a:uFillTx/>
+            </a:endParaRPr>
+          </a:p>
+        </p:txBody>
+      </p:sp>
+    </p:spTree>
+    <p:extLst>
+      <p:ext uri="{BB962C8B-B14F-4D97-AF65-F5344CB8AC3E}">
+        <p14:creationId xmlns:p14="http://schemas.microsoft.com/office/powerpoint/2010/main" val="220040464"/>
       </p:ext>
     </p:extLst>
   </p:cSld>
@@ -1700,7 +2836,7 @@
                 </a:solidFill>
               </a:rPr>
               <a:pPr/>
-              <a:t>2017/10/03</a:t>
+              <a:t>2017/11/15</a:t>
             </a:fld>
             <a:endParaRPr lang="en-US">
               <a:solidFill>
@@ -2005,7 +3141,7 @@
                 </a:solidFill>
               </a:rPr>
               <a:pPr/>
-              <a:t>2017/10/03</a:t>
+              <a:t>2017/11/15</a:t>
             </a:fld>
             <a:endParaRPr lang="en-US">
               <a:solidFill>
@@ -2242,7 +3378,7 @@
             <a:fld id="{EE1C84F4-270C-2249-89D9-A705BDADDAAB}" type="datetime1">
               <a:rPr lang="en-ZA" smtClean="0"/>
               <a:pPr/>
-              <a:t>2017/10/03</a:t>
+              <a:t>2017/11/15</a:t>
             </a:fld>
             <a:endParaRPr lang="en-US"/>
           </a:p>
@@ -2581,7 +3717,7 @@
             <a:fld id="{2AE6851E-022E-D141-8BE0-1745E9557F71}" type="datetime1">
               <a:rPr lang="en-ZA" smtClean="0"/>
               <a:pPr/>
-              <a:t>2017/10/03</a:t>
+              <a:t>2017/11/15</a:t>
             </a:fld>
             <a:endParaRPr lang="en-US"/>
           </a:p>
@@ -3153,7 +4289,7 @@
           <a:p>
             <a:r>
               <a:rPr lang="en-US" dirty="0"/>
-              <a:t>October 2017</a:t>
+              <a:t>November 2017</a:t>
             </a:r>
           </a:p>
         </p:txBody>
@@ -3171,7 +4307,7 @@
 </p:sld>
 </file>
 
-<file path=ppt/slides/slide2.xml><?xml version="1.0" encoding="utf-8"?>
+<file path=ppt/slides/slide10.xml><?xml version="1.0" encoding="utf-8"?>
 <p:sld xmlns:a="http://schemas.openxmlformats.org/drawingml/2006/main" xmlns:r="http://schemas.openxmlformats.org/officeDocument/2006/relationships" xmlns:p="http://schemas.openxmlformats.org/presentationml/2006/main">
   <p:cSld>
     <p:spTree>
@@ -3205,7 +4341,7 @@
           <a:p>
             <a:r>
               <a:rPr lang="en-US" dirty="0"/>
-              <a:t>Defects Corrected</a:t>
+              <a:t>Code Generation Wizard</a:t>
             </a:r>
           </a:p>
         </p:txBody>
@@ -3223,7 +4359,7 @@
         <p:spPr>
           <a:xfrm>
             <a:off x="466025" y="1366944"/>
-            <a:ext cx="9468807" cy="5008456"/>
+            <a:ext cx="3539047" cy="1915752"/>
           </a:xfrm>
         </p:spPr>
         <p:txBody>
@@ -3233,35 +4369,53 @@
             <a:pPr lvl="1"/>
             <a:r>
               <a:rPr lang="en-US" sz="2400" dirty="0"/>
-              <a:t>The module name for a partner’s menu item is not being localized when displayed in the window manager</a:t>
-            </a:r>
-          </a:p>
-          <a:p>
-            <a:pPr lvl="2"/>
-            <a:r>
-              <a:rPr lang="en-US" sz="2200" dirty="0"/>
-              <a:t>Resolved in </a:t>
-            </a:r>
-            <a:r>
-              <a:rPr lang="en-US" sz="2200" dirty="0" err="1"/>
-              <a:t>LocalizeMenuItems</a:t>
-            </a:r>
-            <a:r>
-              <a:rPr lang="en-US" sz="2200" dirty="0"/>
-              <a:t> of the </a:t>
-            </a:r>
-            <a:r>
-              <a:rPr lang="en-US" sz="2200" dirty="0" err="1"/>
-              <a:t>HomeController</a:t>
-            </a:r>
-            <a:endParaRPr lang="en-US" sz="2200" dirty="0"/>
-          </a:p>
-        </p:txBody>
-      </p:sp>
+              <a:t>New Composition Tab for Header-Detail Type to generate composition logic in Business Repository class</a:t>
+            </a:r>
+          </a:p>
+          <a:p>
+            <a:pPr lvl="1"/>
+            <a:r>
+              <a:rPr lang="en-US" sz="2400" dirty="0"/>
+              <a:t>Save/Cancel to update tree</a:t>
+            </a:r>
+            <a:endParaRPr lang="en-US" dirty="0"/>
+          </a:p>
+        </p:txBody>
+      </p:sp>
+      <p:pic>
+        <p:nvPicPr>
+          <p:cNvPr id="2" name="Picture 1">
+            <a:extLst>
+              <a:ext uri="{FF2B5EF4-FFF2-40B4-BE49-F238E27FC236}">
+                <a16:creationId xmlns:a16="http://schemas.microsoft.com/office/drawing/2014/main" id="{B37A004B-2583-4970-A17B-405C266CCE4F}"/>
+              </a:ext>
+            </a:extLst>
+          </p:cNvPr>
+          <p:cNvPicPr>
+            <a:picLocks noChangeAspect="1"/>
+          </p:cNvPicPr>
+          <p:nvPr/>
+        </p:nvPicPr>
+        <p:blipFill>
+          <a:blip r:embed="rId3"/>
+          <a:stretch>
+            <a:fillRect/>
+          </a:stretch>
+        </p:blipFill>
+        <p:spPr>
+          <a:xfrm>
+            <a:off x="4180141" y="1366944"/>
+            <a:ext cx="7624473" cy="5125296"/>
+          </a:xfrm>
+          <a:prstGeom prst="rect">
+            <a:avLst/>
+          </a:prstGeom>
+        </p:spPr>
+      </p:pic>
     </p:spTree>
     <p:extLst>
       <p:ext uri="{BB962C8B-B14F-4D97-AF65-F5344CB8AC3E}">
-        <p14:creationId xmlns:p14="http://schemas.microsoft.com/office/powerpoint/2010/main" val="2363019514"/>
+        <p14:creationId xmlns:p14="http://schemas.microsoft.com/office/powerpoint/2010/main" val="2802362469"/>
       </p:ext>
     </p:extLst>
   </p:cSld>
@@ -3271,7 +4425,7 @@
 </p:sld>
 </file>
 
-<file path=ppt/slides/slide3.xml><?xml version="1.0" encoding="utf-8"?>
+<file path=ppt/slides/slide11.xml><?xml version="1.0" encoding="utf-8"?>
 <p:sld xmlns:a="http://schemas.openxmlformats.org/drawingml/2006/main" xmlns:r="http://schemas.openxmlformats.org/officeDocument/2006/relationships" xmlns:p="http://schemas.openxmlformats.org/presentationml/2006/main">
   <p:cSld>
     <p:spTree>
@@ -3305,7 +4459,7 @@
           <a:p>
             <a:r>
               <a:rPr lang="en-US" dirty="0"/>
-              <a:t>Documentation</a:t>
+              <a:t>Code Generation Wizard</a:t>
             </a:r>
           </a:p>
         </p:txBody>
@@ -3323,7 +4477,7 @@
         <p:spPr>
           <a:xfrm>
             <a:off x="466025" y="1366944"/>
-            <a:ext cx="8954812" cy="5008456"/>
+            <a:ext cx="3539047" cy="1915752"/>
           </a:xfrm>
         </p:spPr>
         <p:txBody>
@@ -3333,21 +4487,46 @@
             <a:pPr lvl="1"/>
             <a:r>
               <a:rPr lang="en-US" sz="2400" dirty="0"/>
-              <a:t>Upgrade Instructions for 2018.0 to 2018.1</a:t>
-            </a:r>
-          </a:p>
-          <a:p>
-            <a:pPr marL="0" lvl="1" indent="0">
-              <a:buNone/>
-            </a:pPr>
-            <a:endParaRPr lang="en-US" sz="1800" dirty="0"/>
-          </a:p>
-        </p:txBody>
-      </p:sp>
+              <a:t>New XML view of entity or entities being generated to better view before generation</a:t>
+            </a:r>
+            <a:endParaRPr lang="en-US" dirty="0"/>
+          </a:p>
+        </p:txBody>
+      </p:sp>
+      <p:pic>
+        <p:nvPicPr>
+          <p:cNvPr id="3" name="Picture 2">
+            <a:extLst>
+              <a:ext uri="{FF2B5EF4-FFF2-40B4-BE49-F238E27FC236}">
+                <a16:creationId xmlns:a16="http://schemas.microsoft.com/office/drawing/2014/main" id="{C5F64DAA-A026-4A54-9A7B-7C69024E8579}"/>
+              </a:ext>
+            </a:extLst>
+          </p:cNvPr>
+          <p:cNvPicPr>
+            <a:picLocks noChangeAspect="1"/>
+          </p:cNvPicPr>
+          <p:nvPr/>
+        </p:nvPicPr>
+        <p:blipFill>
+          <a:blip r:embed="rId3"/>
+          <a:stretch>
+            <a:fillRect/>
+          </a:stretch>
+        </p:blipFill>
+        <p:spPr>
+          <a:xfrm>
+            <a:off x="4216717" y="1662303"/>
+            <a:ext cx="7800803" cy="4756785"/>
+          </a:xfrm>
+          <a:prstGeom prst="rect">
+            <a:avLst/>
+          </a:prstGeom>
+        </p:spPr>
+      </p:pic>
     </p:spTree>
     <p:extLst>
       <p:ext uri="{BB962C8B-B14F-4D97-AF65-F5344CB8AC3E}">
-        <p14:creationId xmlns:p14="http://schemas.microsoft.com/office/powerpoint/2010/main" val="3846550886"/>
+        <p14:creationId xmlns:p14="http://schemas.microsoft.com/office/powerpoint/2010/main" val="434645853"/>
       </p:ext>
     </p:extLst>
   </p:cSld>
@@ -3357,7 +4536,7 @@
 </p:sld>
 </file>
 
-<file path=ppt/slides/slide4.xml><?xml version="1.0" encoding="utf-8"?>
+<file path=ppt/slides/slide12.xml><?xml version="1.0" encoding="utf-8"?>
 <p:sld xmlns:a="http://schemas.openxmlformats.org/drawingml/2006/main" xmlns:r="http://schemas.openxmlformats.org/officeDocument/2006/relationships" xmlns:p="http://schemas.openxmlformats.org/presentationml/2006/main">
   <p:cSld>
     <p:spTree>
@@ -3391,170 +4570,6 @@
           <a:p>
             <a:r>
               <a:rPr lang="en-US" dirty="0"/>
-              <a:t>Solution Wizard</a:t>
-            </a:r>
-          </a:p>
-        </p:txBody>
-      </p:sp>
-      <p:sp>
-        <p:nvSpPr>
-          <p:cNvPr id="12" name="Content Placeholder 4"/>
-          <p:cNvSpPr>
-            <a:spLocks noGrp="1"/>
-          </p:cNvSpPr>
-          <p:nvPr>
-            <p:ph idx="1"/>
-          </p:nvPr>
-        </p:nvSpPr>
-        <p:spPr>
-          <a:xfrm>
-            <a:off x="466025" y="1366944"/>
-            <a:ext cx="9917047" cy="5008456"/>
-          </a:xfrm>
-        </p:spPr>
-        <p:txBody>
-          <a:bodyPr numCol="1"/>
-          <a:lstStyle/>
-          <a:p>
-            <a:pPr lvl="1"/>
-            <a:r>
-              <a:rPr lang="en-US" sz="2400" dirty="0"/>
-              <a:t>Global Files Updated to 2018.1</a:t>
-            </a:r>
-          </a:p>
-        </p:txBody>
-      </p:sp>
-    </p:spTree>
-    <p:extLst>
-      <p:ext uri="{BB962C8B-B14F-4D97-AF65-F5344CB8AC3E}">
-        <p14:creationId xmlns:p14="http://schemas.microsoft.com/office/powerpoint/2010/main" val="934146181"/>
-      </p:ext>
-    </p:extLst>
-  </p:cSld>
-  <p:clrMapOvr>
-    <a:masterClrMapping/>
-  </p:clrMapOvr>
-</p:sld>
-</file>
-
-<file path=ppt/slides/slide5.xml><?xml version="1.0" encoding="utf-8"?>
-<p:sld xmlns:a="http://schemas.openxmlformats.org/drawingml/2006/main" xmlns:r="http://schemas.openxmlformats.org/officeDocument/2006/relationships" xmlns:p="http://schemas.openxmlformats.org/presentationml/2006/main">
-  <p:cSld>
-    <p:spTree>
-      <p:nvGrpSpPr>
-        <p:cNvPr id="1" name=""/>
-        <p:cNvGrpSpPr/>
-        <p:nvPr/>
-      </p:nvGrpSpPr>
-      <p:grpSpPr>
-        <a:xfrm>
-          <a:off x="0" y="0"/>
-          <a:ext cx="0" cy="0"/>
-          <a:chOff x="0" y="0"/>
-          <a:chExt cx="0" cy="0"/>
-        </a:xfrm>
-      </p:grpSpPr>
-      <p:sp>
-        <p:nvSpPr>
-          <p:cNvPr id="8" name="Title 7"/>
-          <p:cNvSpPr>
-            <a:spLocks noGrp="1"/>
-          </p:cNvSpPr>
-          <p:nvPr>
-            <p:ph type="title"/>
-          </p:nvPr>
-        </p:nvSpPr>
-        <p:spPr/>
-        <p:txBody>
-          <a:bodyPr/>
-          <a:lstStyle/>
-          <a:p>
-            <a:r>
-              <a:rPr lang="en-US" dirty="0"/>
-              <a:t>Code Generation Wizard</a:t>
-            </a:r>
-          </a:p>
-        </p:txBody>
-      </p:sp>
-      <p:sp>
-        <p:nvSpPr>
-          <p:cNvPr id="12" name="Content Placeholder 4"/>
-          <p:cNvSpPr>
-            <a:spLocks noGrp="1"/>
-          </p:cNvSpPr>
-          <p:nvPr>
-            <p:ph idx="1"/>
-          </p:nvPr>
-        </p:nvSpPr>
-        <p:spPr>
-          <a:xfrm>
-            <a:off x="466025" y="1366944"/>
-            <a:ext cx="5643373" cy="5008456"/>
-          </a:xfrm>
-        </p:spPr>
-        <p:txBody>
-          <a:bodyPr numCol="1"/>
-          <a:lstStyle/>
-          <a:p>
-            <a:pPr lvl="1"/>
-            <a:r>
-              <a:rPr lang="en-US" sz="2400" dirty="0"/>
-              <a:t>Global Files Updated to 2018.1</a:t>
-            </a:r>
-          </a:p>
-          <a:p>
-            <a:pPr lvl="2"/>
-            <a:endParaRPr lang="en-US" dirty="0"/>
-          </a:p>
-        </p:txBody>
-      </p:sp>
-    </p:spTree>
-    <p:extLst>
-      <p:ext uri="{BB962C8B-B14F-4D97-AF65-F5344CB8AC3E}">
-        <p14:creationId xmlns:p14="http://schemas.microsoft.com/office/powerpoint/2010/main" val="654505585"/>
-      </p:ext>
-    </p:extLst>
-  </p:cSld>
-  <p:clrMapOvr>
-    <a:masterClrMapping/>
-  </p:clrMapOvr>
-</p:sld>
-</file>
-
-<file path=ppt/slides/slide6.xml><?xml version="1.0" encoding="utf-8"?>
-<p:sld xmlns:a="http://schemas.openxmlformats.org/drawingml/2006/main" xmlns:r="http://schemas.openxmlformats.org/officeDocument/2006/relationships" xmlns:p="http://schemas.openxmlformats.org/presentationml/2006/main">
-  <p:cSld>
-    <p:spTree>
-      <p:nvGrpSpPr>
-        <p:cNvPr id="1" name=""/>
-        <p:cNvGrpSpPr/>
-        <p:nvPr/>
-      </p:nvGrpSpPr>
-      <p:grpSpPr>
-        <a:xfrm>
-          <a:off x="0" y="0"/>
-          <a:ext cx="0" cy="0"/>
-          <a:chOff x="0" y="0"/>
-          <a:chExt cx="0" cy="0"/>
-        </a:xfrm>
-      </p:grpSpPr>
-      <p:sp>
-        <p:nvSpPr>
-          <p:cNvPr id="8" name="Title 7"/>
-          <p:cNvSpPr>
-            <a:spLocks noGrp="1"/>
-          </p:cNvSpPr>
-          <p:nvPr>
-            <p:ph type="title"/>
-          </p:nvPr>
-        </p:nvSpPr>
-        <p:spPr/>
-        <p:txBody>
-          <a:bodyPr/>
-          <a:lstStyle/>
-          <a:p>
-            <a:r>
-              <a:rPr lang="en-US" dirty="0"/>
               <a:t>Upgrade Wizard</a:t>
             </a:r>
           </a:p>
@@ -3608,7 +4623,7 @@
 </p:sld>
 </file>
 
-<file path=ppt/slides/slide7.xml><?xml version="1.0" encoding="utf-8"?>
+<file path=ppt/slides/slide13.xml><?xml version="1.0" encoding="utf-8"?>
 <p:sld xmlns:a="http://schemas.openxmlformats.org/drawingml/2006/main" xmlns:r="http://schemas.openxmlformats.org/officeDocument/2006/relationships" xmlns:p="http://schemas.openxmlformats.org/presentationml/2006/main">
   <p:cSld>
     <p:spTree>
@@ -3739,6 +4754,1146 @@
 </p:sld>
 </file>
 
+<file path=ppt/slides/slide14.xml><?xml version="1.0" encoding="utf-8"?>
+<p:sld xmlns:a="http://schemas.openxmlformats.org/drawingml/2006/main" xmlns:r="http://schemas.openxmlformats.org/officeDocument/2006/relationships" xmlns:p="http://schemas.openxmlformats.org/presentationml/2006/main">
+  <p:cSld>
+    <p:spTree>
+      <p:nvGrpSpPr>
+        <p:cNvPr id="1" name=""/>
+        <p:cNvGrpSpPr/>
+        <p:nvPr/>
+      </p:nvGrpSpPr>
+      <p:grpSpPr>
+        <a:xfrm>
+          <a:off x="0" y="0"/>
+          <a:ext cx="0" cy="0"/>
+          <a:chOff x="0" y="0"/>
+          <a:chExt cx="0" cy="0"/>
+        </a:xfrm>
+      </p:grpSpPr>
+      <p:sp>
+        <p:nvSpPr>
+          <p:cNvPr id="8" name="Title 7"/>
+          <p:cNvSpPr>
+            <a:spLocks noGrp="1"/>
+          </p:cNvSpPr>
+          <p:nvPr>
+            <p:ph type="title"/>
+          </p:nvPr>
+        </p:nvSpPr>
+        <p:spPr/>
+        <p:txBody>
+          <a:bodyPr/>
+          <a:lstStyle/>
+          <a:p>
+            <a:r>
+              <a:rPr lang="en-US" dirty="0"/>
+              <a:t> Customization Wizard</a:t>
+            </a:r>
+          </a:p>
+        </p:txBody>
+      </p:sp>
+      <p:sp>
+        <p:nvSpPr>
+          <p:cNvPr id="12" name="Content Placeholder 4"/>
+          <p:cNvSpPr>
+            <a:spLocks noGrp="1"/>
+          </p:cNvSpPr>
+          <p:nvPr>
+            <p:ph idx="1"/>
+          </p:nvPr>
+        </p:nvSpPr>
+        <p:spPr>
+          <a:xfrm>
+            <a:off x="466024" y="1366944"/>
+            <a:ext cx="11238295" cy="5008456"/>
+          </a:xfrm>
+        </p:spPr>
+        <p:txBody>
+          <a:bodyPr numCol="1"/>
+          <a:lstStyle/>
+          <a:p>
+            <a:pPr lvl="1"/>
+            <a:r>
+              <a:rPr lang="en-US" sz="2400" dirty="0"/>
+              <a:t>Global Files Updated to 2018.1</a:t>
+            </a:r>
+          </a:p>
+          <a:p>
+            <a:pPr lvl="1"/>
+            <a:r>
+              <a:rPr lang="en-US" sz="2400" dirty="0"/>
+              <a:t>Controller, if generated by Customization Wizard Plugin, now inherits from MultitenantBaseController instead of Controller</a:t>
+            </a:r>
+          </a:p>
+          <a:p>
+            <a:pPr lvl="1"/>
+            <a:endParaRPr lang="en-US" sz="2400" dirty="0"/>
+          </a:p>
+        </p:txBody>
+      </p:sp>
+    </p:spTree>
+    <p:extLst>
+      <p:ext uri="{BB962C8B-B14F-4D97-AF65-F5344CB8AC3E}">
+        <p14:creationId xmlns:p14="http://schemas.microsoft.com/office/powerpoint/2010/main" val="1322763348"/>
+      </p:ext>
+    </p:extLst>
+  </p:cSld>
+  <p:clrMapOvr>
+    <a:masterClrMapping/>
+  </p:clrMapOvr>
+</p:sld>
+</file>
+
+<file path=ppt/slides/slide15.xml><?xml version="1.0" encoding="utf-8"?>
+<p:sld xmlns:a="http://schemas.openxmlformats.org/drawingml/2006/main" xmlns:r="http://schemas.openxmlformats.org/officeDocument/2006/relationships" xmlns:p="http://schemas.openxmlformats.org/presentationml/2006/main">
+  <p:cSld>
+    <p:spTree>
+      <p:nvGrpSpPr>
+        <p:cNvPr id="1" name=""/>
+        <p:cNvGrpSpPr/>
+        <p:nvPr/>
+      </p:nvGrpSpPr>
+      <p:grpSpPr>
+        <a:xfrm>
+          <a:off x="0" y="0"/>
+          <a:ext cx="0" cy="0"/>
+          <a:chOff x="0" y="0"/>
+          <a:chExt cx="0" cy="0"/>
+        </a:xfrm>
+      </p:grpSpPr>
+      <p:sp>
+        <p:nvSpPr>
+          <p:cNvPr id="8" name="Title 7"/>
+          <p:cNvSpPr>
+            <a:spLocks noGrp="1"/>
+          </p:cNvSpPr>
+          <p:nvPr>
+            <p:ph type="title"/>
+          </p:nvPr>
+        </p:nvSpPr>
+        <p:spPr/>
+        <p:txBody>
+          <a:bodyPr/>
+          <a:lstStyle/>
+          <a:p>
+            <a:r>
+              <a:rPr lang="en-US" dirty="0"/>
+              <a:t> Vertical Menus</a:t>
+            </a:r>
+          </a:p>
+        </p:txBody>
+      </p:sp>
+      <p:sp>
+        <p:nvSpPr>
+          <p:cNvPr id="12" name="Content Placeholder 4"/>
+          <p:cNvSpPr>
+            <a:spLocks noGrp="1"/>
+          </p:cNvSpPr>
+          <p:nvPr>
+            <p:ph idx="1"/>
+          </p:nvPr>
+        </p:nvSpPr>
+        <p:spPr>
+          <a:xfrm>
+            <a:off x="466025" y="1366944"/>
+            <a:ext cx="3017839" cy="5008456"/>
+          </a:xfrm>
+        </p:spPr>
+        <p:txBody>
+          <a:bodyPr numCol="1"/>
+          <a:lstStyle/>
+          <a:p>
+            <a:pPr lvl="1"/>
+            <a:r>
+              <a:rPr lang="en-US" sz="2400" dirty="0"/>
+              <a:t>New for 2018.1!</a:t>
+            </a:r>
+          </a:p>
+          <a:p>
+            <a:pPr lvl="1"/>
+            <a:r>
+              <a:rPr lang="en-US" sz="2400" dirty="0"/>
+              <a:t>No code changes required</a:t>
+            </a:r>
+          </a:p>
+          <a:p>
+            <a:pPr lvl="1"/>
+            <a:r>
+              <a:rPr lang="en-US" sz="2400" dirty="0"/>
+              <a:t>Will be assigned default icon in menu</a:t>
+            </a:r>
+          </a:p>
+          <a:p>
+            <a:pPr lvl="2"/>
+            <a:r>
+              <a:rPr lang="en-US" sz="2000" dirty="0"/>
+              <a:t>2018.2 will address to allow partner to specify icon in Menu Details XML</a:t>
+            </a:r>
+          </a:p>
+          <a:p>
+            <a:pPr lvl="2"/>
+            <a:r>
+              <a:rPr lang="en-US" sz="2000" dirty="0"/>
+              <a:t>Partner will deliver icon, along with assemblies and other files, to a certain folder</a:t>
+            </a:r>
+          </a:p>
+        </p:txBody>
+      </p:sp>
+      <p:pic>
+        <p:nvPicPr>
+          <p:cNvPr id="2" name="Picture 1">
+            <a:extLst>
+              <a:ext uri="{FF2B5EF4-FFF2-40B4-BE49-F238E27FC236}">
+                <a16:creationId xmlns:a16="http://schemas.microsoft.com/office/drawing/2014/main" id="{40F088BC-B560-4520-9DFC-3DFE7D92810D}"/>
+              </a:ext>
+            </a:extLst>
+          </p:cNvPr>
+          <p:cNvPicPr>
+            <a:picLocks noChangeAspect="1"/>
+          </p:cNvPicPr>
+          <p:nvPr/>
+        </p:nvPicPr>
+        <p:blipFill>
+          <a:blip r:embed="rId3"/>
+          <a:stretch>
+            <a:fillRect/>
+          </a:stretch>
+        </p:blipFill>
+        <p:spPr>
+          <a:xfrm>
+            <a:off x="3791121" y="1085912"/>
+            <a:ext cx="8123512" cy="4686175"/>
+          </a:xfrm>
+          <a:prstGeom prst="rect">
+            <a:avLst/>
+          </a:prstGeom>
+        </p:spPr>
+      </p:pic>
+    </p:spTree>
+    <p:extLst>
+      <p:ext uri="{BB962C8B-B14F-4D97-AF65-F5344CB8AC3E}">
+        <p14:creationId xmlns:p14="http://schemas.microsoft.com/office/powerpoint/2010/main" val="1361703577"/>
+      </p:ext>
+    </p:extLst>
+  </p:cSld>
+  <p:clrMapOvr>
+    <a:masterClrMapping/>
+  </p:clrMapOvr>
+</p:sld>
+</file>
+
+<file path=ppt/slides/slide16.xml><?xml version="1.0" encoding="utf-8"?>
+<p:sld xmlns:a="http://schemas.openxmlformats.org/drawingml/2006/main" xmlns:r="http://schemas.openxmlformats.org/officeDocument/2006/relationships" xmlns:p="http://schemas.openxmlformats.org/presentationml/2006/main">
+  <p:cSld>
+    <p:spTree>
+      <p:nvGrpSpPr>
+        <p:cNvPr id="1" name=""/>
+        <p:cNvGrpSpPr/>
+        <p:nvPr/>
+      </p:nvGrpSpPr>
+      <p:grpSpPr>
+        <a:xfrm>
+          <a:off x="0" y="0"/>
+          <a:ext cx="0" cy="0"/>
+          <a:chOff x="0" y="0"/>
+          <a:chExt cx="0" cy="0"/>
+        </a:xfrm>
+      </p:grpSpPr>
+      <p:sp>
+        <p:nvSpPr>
+          <p:cNvPr id="8" name="Title 7"/>
+          <p:cNvSpPr>
+            <a:spLocks noGrp="1"/>
+          </p:cNvSpPr>
+          <p:nvPr>
+            <p:ph type="title"/>
+          </p:nvPr>
+        </p:nvSpPr>
+        <p:spPr/>
+        <p:txBody>
+          <a:bodyPr/>
+          <a:lstStyle/>
+          <a:p>
+            <a:r>
+              <a:rPr lang="en-US" dirty="0"/>
+              <a:t> Web API</a:t>
+            </a:r>
+          </a:p>
+        </p:txBody>
+      </p:sp>
+      <p:sp>
+        <p:nvSpPr>
+          <p:cNvPr id="12" name="Content Placeholder 4"/>
+          <p:cNvSpPr>
+            <a:spLocks noGrp="1"/>
+          </p:cNvSpPr>
+          <p:nvPr>
+            <p:ph idx="1"/>
+          </p:nvPr>
+        </p:nvSpPr>
+        <p:spPr>
+          <a:xfrm>
+            <a:off x="466025" y="1366944"/>
+            <a:ext cx="5404423" cy="5008456"/>
+          </a:xfrm>
+        </p:spPr>
+        <p:txBody>
+          <a:bodyPr numCol="1"/>
+          <a:lstStyle/>
+          <a:p>
+            <a:pPr lvl="1"/>
+            <a:r>
+              <a:rPr lang="en-US" sz="2400" dirty="0"/>
+              <a:t>New GL Segments endpoint</a:t>
+            </a:r>
+            <a:endParaRPr lang="en-US" sz="2000" dirty="0"/>
+          </a:p>
+        </p:txBody>
+      </p:sp>
+    </p:spTree>
+    <p:extLst>
+      <p:ext uri="{BB962C8B-B14F-4D97-AF65-F5344CB8AC3E}">
+        <p14:creationId xmlns:p14="http://schemas.microsoft.com/office/powerpoint/2010/main" val="2353665602"/>
+      </p:ext>
+    </p:extLst>
+  </p:cSld>
+  <p:clrMapOvr>
+    <a:masterClrMapping/>
+  </p:clrMapOvr>
+</p:sld>
+</file>
+
+<file path=ppt/slides/slide17.xml><?xml version="1.0" encoding="utf-8"?>
+<p:sld xmlns:a="http://schemas.openxmlformats.org/drawingml/2006/main" xmlns:r="http://schemas.openxmlformats.org/officeDocument/2006/relationships" xmlns:p="http://schemas.openxmlformats.org/presentationml/2006/main">
+  <p:cSld>
+    <p:spTree>
+      <p:nvGrpSpPr>
+        <p:cNvPr id="1" name=""/>
+        <p:cNvGrpSpPr/>
+        <p:nvPr/>
+      </p:nvGrpSpPr>
+      <p:grpSpPr>
+        <a:xfrm>
+          <a:off x="0" y="0"/>
+          <a:ext cx="0" cy="0"/>
+          <a:chOff x="0" y="0"/>
+          <a:chExt cx="0" cy="0"/>
+        </a:xfrm>
+      </p:grpSpPr>
+      <p:sp>
+        <p:nvSpPr>
+          <p:cNvPr id="8" name="Title 7"/>
+          <p:cNvSpPr>
+            <a:spLocks noGrp="1"/>
+          </p:cNvSpPr>
+          <p:nvPr>
+            <p:ph type="title"/>
+          </p:nvPr>
+        </p:nvSpPr>
+        <p:spPr/>
+        <p:txBody>
+          <a:bodyPr/>
+          <a:lstStyle/>
+          <a:p>
+            <a:r>
+              <a:rPr lang="en-US" dirty="0"/>
+              <a:t>GitHub Repository</a:t>
+            </a:r>
+          </a:p>
+        </p:txBody>
+      </p:sp>
+      <p:sp>
+        <p:nvSpPr>
+          <p:cNvPr id="12" name="Content Placeholder 4"/>
+          <p:cNvSpPr>
+            <a:spLocks noGrp="1"/>
+          </p:cNvSpPr>
+          <p:nvPr>
+            <p:ph idx="1"/>
+          </p:nvPr>
+        </p:nvSpPr>
+        <p:spPr>
+          <a:xfrm>
+            <a:off x="466025" y="1366944"/>
+            <a:ext cx="11231999" cy="5008456"/>
+          </a:xfrm>
+        </p:spPr>
+        <p:txBody>
+          <a:bodyPr numCol="1"/>
+          <a:lstStyle/>
+          <a:p>
+            <a:pPr lvl="1"/>
+            <a:r>
+              <a:rPr lang="en-US" sz="2400" dirty="0"/>
+              <a:t>Open Source</a:t>
+            </a:r>
+          </a:p>
+          <a:p>
+            <a:pPr lvl="2"/>
+            <a:r>
+              <a:rPr lang="en-US" sz="2000" dirty="0">
+                <a:hlinkClick r:id="rId3"/>
+              </a:rPr>
+              <a:t>https://github.com/SageNADev/Sage300-SDK</a:t>
+            </a:r>
+            <a:endParaRPr lang="en-US" sz="2000" dirty="0"/>
+          </a:p>
+          <a:p>
+            <a:pPr lvl="2"/>
+            <a:r>
+              <a:rPr lang="en-US" sz="2000" dirty="0"/>
+              <a:t>2018.1 is available in the “master” branch</a:t>
+            </a:r>
+          </a:p>
+          <a:p>
+            <a:pPr lvl="2"/>
+            <a:r>
+              <a:rPr lang="en-US" sz="2000" dirty="0"/>
+              <a:t>2018.0 is available in the “release-2018” branch (archive)</a:t>
+            </a:r>
+          </a:p>
+          <a:p>
+            <a:pPr lvl="2"/>
+            <a:r>
+              <a:rPr lang="en-US" sz="2000" dirty="0"/>
+              <a:t>2017.2 is available in the “release-2017.2” branch (archive)</a:t>
+            </a:r>
+          </a:p>
+          <a:p>
+            <a:pPr lvl="2"/>
+            <a:r>
+              <a:rPr lang="en-US" sz="2000" dirty="0"/>
+              <a:t>2017.1 is available in the “release-2017.1” branch (archive)</a:t>
+            </a:r>
+          </a:p>
+          <a:p>
+            <a:pPr lvl="2"/>
+            <a:r>
+              <a:rPr lang="en-US" sz="2000" dirty="0"/>
+              <a:t>2017 is available in the “release-2017” branch (archive)</a:t>
+            </a:r>
+          </a:p>
+          <a:p>
+            <a:pPr lvl="2"/>
+            <a:r>
+              <a:rPr lang="en-US" sz="2000" dirty="0"/>
+              <a:t>2018.2 is available in the “develop” branch (in-progress)</a:t>
+            </a:r>
+          </a:p>
+          <a:p>
+            <a:pPr lvl="2"/>
+            <a:endParaRPr lang="en-US" dirty="0"/>
+          </a:p>
+        </p:txBody>
+      </p:sp>
+    </p:spTree>
+    <p:extLst>
+      <p:ext uri="{BB962C8B-B14F-4D97-AF65-F5344CB8AC3E}">
+        <p14:creationId xmlns:p14="http://schemas.microsoft.com/office/powerpoint/2010/main" val="1784428590"/>
+      </p:ext>
+    </p:extLst>
+  </p:cSld>
+  <p:clrMapOvr>
+    <a:masterClrMapping/>
+  </p:clrMapOvr>
+</p:sld>
+</file>
+
+<file path=ppt/slides/slide2.xml><?xml version="1.0" encoding="utf-8"?>
+<p:sld xmlns:a="http://schemas.openxmlformats.org/drawingml/2006/main" xmlns:r="http://schemas.openxmlformats.org/officeDocument/2006/relationships" xmlns:p="http://schemas.openxmlformats.org/presentationml/2006/main">
+  <p:cSld>
+    <p:spTree>
+      <p:nvGrpSpPr>
+        <p:cNvPr id="1" name=""/>
+        <p:cNvGrpSpPr/>
+        <p:nvPr/>
+      </p:nvGrpSpPr>
+      <p:grpSpPr>
+        <a:xfrm>
+          <a:off x="0" y="0"/>
+          <a:ext cx="0" cy="0"/>
+          <a:chOff x="0" y="0"/>
+          <a:chExt cx="0" cy="0"/>
+        </a:xfrm>
+      </p:grpSpPr>
+      <p:sp>
+        <p:nvSpPr>
+          <p:cNvPr id="8" name="Title 7"/>
+          <p:cNvSpPr>
+            <a:spLocks noGrp="1"/>
+          </p:cNvSpPr>
+          <p:nvPr>
+            <p:ph type="title"/>
+          </p:nvPr>
+        </p:nvSpPr>
+        <p:spPr/>
+        <p:txBody>
+          <a:bodyPr/>
+          <a:lstStyle/>
+          <a:p>
+            <a:r>
+              <a:rPr lang="en-US" dirty="0"/>
+              <a:t>Defects Corrected</a:t>
+            </a:r>
+          </a:p>
+        </p:txBody>
+      </p:sp>
+      <p:sp>
+        <p:nvSpPr>
+          <p:cNvPr id="12" name="Content Placeholder 4"/>
+          <p:cNvSpPr>
+            <a:spLocks noGrp="1"/>
+          </p:cNvSpPr>
+          <p:nvPr>
+            <p:ph idx="1"/>
+          </p:nvPr>
+        </p:nvSpPr>
+        <p:spPr>
+          <a:xfrm>
+            <a:off x="466025" y="1366944"/>
+            <a:ext cx="9468807" cy="5008456"/>
+          </a:xfrm>
+        </p:spPr>
+        <p:txBody>
+          <a:bodyPr numCol="1"/>
+          <a:lstStyle/>
+          <a:p>
+            <a:pPr lvl="1"/>
+            <a:r>
+              <a:rPr lang="en-US" sz="2400" dirty="0"/>
+              <a:t>The module name for a partner’s menu item is not being localized when displayed in the window manager</a:t>
+            </a:r>
+          </a:p>
+          <a:p>
+            <a:pPr lvl="2"/>
+            <a:r>
+              <a:rPr lang="en-US" sz="2200" dirty="0"/>
+              <a:t>Resolved in </a:t>
+            </a:r>
+            <a:r>
+              <a:rPr lang="en-US" sz="2200" dirty="0" err="1"/>
+              <a:t>LocalizeMenuItems</a:t>
+            </a:r>
+            <a:r>
+              <a:rPr lang="en-US" sz="2200" dirty="0"/>
+              <a:t> of the </a:t>
+            </a:r>
+            <a:r>
+              <a:rPr lang="en-US" sz="2200" dirty="0" err="1"/>
+              <a:t>HomeController</a:t>
+            </a:r>
+            <a:endParaRPr lang="en-US" sz="2200" dirty="0"/>
+          </a:p>
+        </p:txBody>
+      </p:sp>
+    </p:spTree>
+    <p:extLst>
+      <p:ext uri="{BB962C8B-B14F-4D97-AF65-F5344CB8AC3E}">
+        <p14:creationId xmlns:p14="http://schemas.microsoft.com/office/powerpoint/2010/main" val="2363019514"/>
+      </p:ext>
+    </p:extLst>
+  </p:cSld>
+  <p:clrMapOvr>
+    <a:masterClrMapping/>
+  </p:clrMapOvr>
+</p:sld>
+</file>
+
+<file path=ppt/slides/slide3.xml><?xml version="1.0" encoding="utf-8"?>
+<p:sld xmlns:a="http://schemas.openxmlformats.org/drawingml/2006/main" xmlns:r="http://schemas.openxmlformats.org/officeDocument/2006/relationships" xmlns:p="http://schemas.openxmlformats.org/presentationml/2006/main">
+  <p:cSld>
+    <p:spTree>
+      <p:nvGrpSpPr>
+        <p:cNvPr id="1" name=""/>
+        <p:cNvGrpSpPr/>
+        <p:nvPr/>
+      </p:nvGrpSpPr>
+      <p:grpSpPr>
+        <a:xfrm>
+          <a:off x="0" y="0"/>
+          <a:ext cx="0" cy="0"/>
+          <a:chOff x="0" y="0"/>
+          <a:chExt cx="0" cy="0"/>
+        </a:xfrm>
+      </p:grpSpPr>
+      <p:sp>
+        <p:nvSpPr>
+          <p:cNvPr id="8" name="Title 7"/>
+          <p:cNvSpPr>
+            <a:spLocks noGrp="1"/>
+          </p:cNvSpPr>
+          <p:nvPr>
+            <p:ph type="title"/>
+          </p:nvPr>
+        </p:nvSpPr>
+        <p:spPr/>
+        <p:txBody>
+          <a:bodyPr/>
+          <a:lstStyle/>
+          <a:p>
+            <a:r>
+              <a:rPr lang="en-US" dirty="0"/>
+              <a:t>Documentation</a:t>
+            </a:r>
+          </a:p>
+        </p:txBody>
+      </p:sp>
+      <p:sp>
+        <p:nvSpPr>
+          <p:cNvPr id="12" name="Content Placeholder 4"/>
+          <p:cNvSpPr>
+            <a:spLocks noGrp="1"/>
+          </p:cNvSpPr>
+          <p:nvPr>
+            <p:ph idx="1"/>
+          </p:nvPr>
+        </p:nvSpPr>
+        <p:spPr>
+          <a:xfrm>
+            <a:off x="466024" y="1366944"/>
+            <a:ext cx="10241599" cy="5008456"/>
+          </a:xfrm>
+        </p:spPr>
+        <p:txBody>
+          <a:bodyPr numCol="1"/>
+          <a:lstStyle/>
+          <a:p>
+            <a:pPr lvl="1"/>
+            <a:r>
+              <a:rPr lang="en-US" sz="2400" dirty="0"/>
+              <a:t>Upgrade Instructions for 2018.0 to 2018.1</a:t>
+            </a:r>
+          </a:p>
+          <a:p>
+            <a:pPr lvl="1"/>
+            <a:r>
+              <a:rPr lang="en-US" sz="2400" dirty="0"/>
+              <a:t>New Coding Patterns document in docs/patterns</a:t>
+            </a:r>
+          </a:p>
+          <a:p>
+            <a:pPr lvl="2"/>
+            <a:r>
+              <a:rPr lang="en-US" sz="2000" dirty="0"/>
+              <a:t>Only 1 pattern documented thus far, but it’s a start!</a:t>
+            </a:r>
+          </a:p>
+          <a:p>
+            <a:pPr lvl="1"/>
+            <a:r>
+              <a:rPr lang="en-US" sz="2400" dirty="0"/>
+              <a:t>Wizard and Tutorial documents modified with updated screenshots</a:t>
+            </a:r>
+          </a:p>
+          <a:p>
+            <a:pPr marL="0" lvl="1" indent="0">
+              <a:buNone/>
+            </a:pPr>
+            <a:endParaRPr lang="en-US" sz="1800" dirty="0"/>
+          </a:p>
+        </p:txBody>
+      </p:sp>
+    </p:spTree>
+    <p:extLst>
+      <p:ext uri="{BB962C8B-B14F-4D97-AF65-F5344CB8AC3E}">
+        <p14:creationId xmlns:p14="http://schemas.microsoft.com/office/powerpoint/2010/main" val="3846550886"/>
+      </p:ext>
+    </p:extLst>
+  </p:cSld>
+  <p:clrMapOvr>
+    <a:masterClrMapping/>
+  </p:clrMapOvr>
+</p:sld>
+</file>
+
+<file path=ppt/slides/slide4.xml><?xml version="1.0" encoding="utf-8"?>
+<p:sld xmlns:a="http://schemas.openxmlformats.org/drawingml/2006/main" xmlns:r="http://schemas.openxmlformats.org/officeDocument/2006/relationships" xmlns:p="http://schemas.openxmlformats.org/presentationml/2006/main">
+  <p:cSld>
+    <p:spTree>
+      <p:nvGrpSpPr>
+        <p:cNvPr id="1" name=""/>
+        <p:cNvGrpSpPr/>
+        <p:nvPr/>
+      </p:nvGrpSpPr>
+      <p:grpSpPr>
+        <a:xfrm>
+          <a:off x="0" y="0"/>
+          <a:ext cx="0" cy="0"/>
+          <a:chOff x="0" y="0"/>
+          <a:chExt cx="0" cy="0"/>
+        </a:xfrm>
+      </p:grpSpPr>
+      <p:sp>
+        <p:nvSpPr>
+          <p:cNvPr id="8" name="Title 7"/>
+          <p:cNvSpPr>
+            <a:spLocks noGrp="1"/>
+          </p:cNvSpPr>
+          <p:nvPr>
+            <p:ph type="title"/>
+          </p:nvPr>
+        </p:nvSpPr>
+        <p:spPr/>
+        <p:txBody>
+          <a:bodyPr/>
+          <a:lstStyle/>
+          <a:p>
+            <a:r>
+              <a:rPr lang="en-US" dirty="0"/>
+              <a:t>Solution Wizard</a:t>
+            </a:r>
+          </a:p>
+        </p:txBody>
+      </p:sp>
+      <p:sp>
+        <p:nvSpPr>
+          <p:cNvPr id="12" name="Content Placeholder 4"/>
+          <p:cNvSpPr>
+            <a:spLocks noGrp="1"/>
+          </p:cNvSpPr>
+          <p:nvPr>
+            <p:ph idx="1"/>
+          </p:nvPr>
+        </p:nvSpPr>
+        <p:spPr>
+          <a:xfrm>
+            <a:off x="466025" y="1366944"/>
+            <a:ext cx="9917047" cy="5008456"/>
+          </a:xfrm>
+        </p:spPr>
+        <p:txBody>
+          <a:bodyPr numCol="1"/>
+          <a:lstStyle/>
+          <a:p>
+            <a:pPr lvl="1"/>
+            <a:r>
+              <a:rPr lang="en-US" sz="2400" dirty="0"/>
+              <a:t>Global Files Updated to 2018.1</a:t>
+            </a:r>
+          </a:p>
+        </p:txBody>
+      </p:sp>
+    </p:spTree>
+    <p:extLst>
+      <p:ext uri="{BB962C8B-B14F-4D97-AF65-F5344CB8AC3E}">
+        <p14:creationId xmlns:p14="http://schemas.microsoft.com/office/powerpoint/2010/main" val="934146181"/>
+      </p:ext>
+    </p:extLst>
+  </p:cSld>
+  <p:clrMapOvr>
+    <a:masterClrMapping/>
+  </p:clrMapOvr>
+</p:sld>
+</file>
+
+<file path=ppt/slides/slide5.xml><?xml version="1.0" encoding="utf-8"?>
+<p:sld xmlns:a="http://schemas.openxmlformats.org/drawingml/2006/main" xmlns:r="http://schemas.openxmlformats.org/officeDocument/2006/relationships" xmlns:p="http://schemas.openxmlformats.org/presentationml/2006/main">
+  <p:cSld>
+    <p:spTree>
+      <p:nvGrpSpPr>
+        <p:cNvPr id="1" name=""/>
+        <p:cNvGrpSpPr/>
+        <p:nvPr/>
+      </p:nvGrpSpPr>
+      <p:grpSpPr>
+        <a:xfrm>
+          <a:off x="0" y="0"/>
+          <a:ext cx="0" cy="0"/>
+          <a:chOff x="0" y="0"/>
+          <a:chExt cx="0" cy="0"/>
+        </a:xfrm>
+      </p:grpSpPr>
+      <p:sp>
+        <p:nvSpPr>
+          <p:cNvPr id="8" name="Title 7"/>
+          <p:cNvSpPr>
+            <a:spLocks noGrp="1"/>
+          </p:cNvSpPr>
+          <p:nvPr>
+            <p:ph type="title"/>
+          </p:nvPr>
+        </p:nvSpPr>
+        <p:spPr/>
+        <p:txBody>
+          <a:bodyPr/>
+          <a:lstStyle/>
+          <a:p>
+            <a:r>
+              <a:rPr lang="en-US" dirty="0"/>
+              <a:t>Code Generation Wizard</a:t>
+            </a:r>
+          </a:p>
+        </p:txBody>
+      </p:sp>
+      <p:sp>
+        <p:nvSpPr>
+          <p:cNvPr id="12" name="Content Placeholder 4"/>
+          <p:cNvSpPr>
+            <a:spLocks noGrp="1"/>
+          </p:cNvSpPr>
+          <p:nvPr>
+            <p:ph idx="1"/>
+          </p:nvPr>
+        </p:nvSpPr>
+        <p:spPr>
+          <a:xfrm>
+            <a:off x="466025" y="1366944"/>
+            <a:ext cx="5281742" cy="5008456"/>
+          </a:xfrm>
+        </p:spPr>
+        <p:txBody>
+          <a:bodyPr numCol="1"/>
+          <a:lstStyle/>
+          <a:p>
+            <a:pPr lvl="1"/>
+            <a:r>
+              <a:rPr lang="en-US" sz="2400" dirty="0"/>
+              <a:t>Global Files Updated to 2018.1</a:t>
+            </a:r>
+          </a:p>
+          <a:p>
+            <a:pPr lvl="1"/>
+            <a:r>
+              <a:rPr lang="en-US" sz="2400" dirty="0"/>
+              <a:t>New UI</a:t>
+            </a:r>
+          </a:p>
+          <a:p>
+            <a:pPr lvl="1"/>
+            <a:r>
+              <a:rPr lang="en-US" sz="2400" dirty="0"/>
+              <a:t>New HeaderDetail Type</a:t>
+            </a:r>
+          </a:p>
+          <a:p>
+            <a:pPr lvl="1"/>
+            <a:r>
+              <a:rPr lang="en-US" sz="2400" dirty="0"/>
+              <a:t>Revised Flow due to multiple views</a:t>
+            </a:r>
+          </a:p>
+          <a:p>
+            <a:pPr lvl="2"/>
+            <a:r>
+              <a:rPr lang="en-US" sz="2000" dirty="0"/>
+              <a:t>Credentials, Module, etc. moved to first step</a:t>
+            </a:r>
+          </a:p>
+          <a:p>
+            <a:pPr lvl="2"/>
+            <a:endParaRPr lang="en-US" dirty="0"/>
+          </a:p>
+        </p:txBody>
+      </p:sp>
+      <p:pic>
+        <p:nvPicPr>
+          <p:cNvPr id="2" name="Picture 1">
+            <a:extLst>
+              <a:ext uri="{FF2B5EF4-FFF2-40B4-BE49-F238E27FC236}">
+                <a16:creationId xmlns:a16="http://schemas.microsoft.com/office/drawing/2014/main" id="{C2EDCA84-A0B3-4B8F-93F5-2F4B2610F06A}"/>
+              </a:ext>
+            </a:extLst>
+          </p:cNvPr>
+          <p:cNvPicPr>
+            <a:picLocks noChangeAspect="1"/>
+          </p:cNvPicPr>
+          <p:nvPr/>
+        </p:nvPicPr>
+        <p:blipFill>
+          <a:blip r:embed="rId3"/>
+          <a:stretch>
+            <a:fillRect/>
+          </a:stretch>
+        </p:blipFill>
+        <p:spPr>
+          <a:xfrm>
+            <a:off x="6444234" y="1138029"/>
+            <a:ext cx="4254246" cy="5237371"/>
+          </a:xfrm>
+          <a:prstGeom prst="rect">
+            <a:avLst/>
+          </a:prstGeom>
+        </p:spPr>
+      </p:pic>
+    </p:spTree>
+    <p:extLst>
+      <p:ext uri="{BB962C8B-B14F-4D97-AF65-F5344CB8AC3E}">
+        <p14:creationId xmlns:p14="http://schemas.microsoft.com/office/powerpoint/2010/main" val="654505585"/>
+      </p:ext>
+    </p:extLst>
+  </p:cSld>
+  <p:clrMapOvr>
+    <a:masterClrMapping/>
+  </p:clrMapOvr>
+</p:sld>
+</file>
+
+<file path=ppt/slides/slide6.xml><?xml version="1.0" encoding="utf-8"?>
+<p:sld xmlns:a="http://schemas.openxmlformats.org/drawingml/2006/main" xmlns:r="http://schemas.openxmlformats.org/officeDocument/2006/relationships" xmlns:p="http://schemas.openxmlformats.org/presentationml/2006/main">
+  <p:cSld>
+    <p:spTree>
+      <p:nvGrpSpPr>
+        <p:cNvPr id="1" name=""/>
+        <p:cNvGrpSpPr/>
+        <p:nvPr/>
+      </p:nvGrpSpPr>
+      <p:grpSpPr>
+        <a:xfrm>
+          <a:off x="0" y="0"/>
+          <a:ext cx="0" cy="0"/>
+          <a:chOff x="0" y="0"/>
+          <a:chExt cx="0" cy="0"/>
+        </a:xfrm>
+      </p:grpSpPr>
+      <p:sp>
+        <p:nvSpPr>
+          <p:cNvPr id="8" name="Title 7"/>
+          <p:cNvSpPr>
+            <a:spLocks noGrp="1"/>
+          </p:cNvSpPr>
+          <p:nvPr>
+            <p:ph type="title"/>
+          </p:nvPr>
+        </p:nvSpPr>
+        <p:spPr/>
+        <p:txBody>
+          <a:bodyPr/>
+          <a:lstStyle/>
+          <a:p>
+            <a:r>
+              <a:rPr lang="en-US" dirty="0"/>
+              <a:t>Code Generation Wizard</a:t>
+            </a:r>
+          </a:p>
+        </p:txBody>
+      </p:sp>
+      <p:sp>
+        <p:nvSpPr>
+          <p:cNvPr id="12" name="Content Placeholder 4"/>
+          <p:cNvSpPr>
+            <a:spLocks noGrp="1"/>
+          </p:cNvSpPr>
+          <p:nvPr>
+            <p:ph idx="1"/>
+          </p:nvPr>
+        </p:nvSpPr>
+        <p:spPr>
+          <a:xfrm>
+            <a:off x="466025" y="1366944"/>
+            <a:ext cx="3913951" cy="3333072"/>
+          </a:xfrm>
+        </p:spPr>
+        <p:txBody>
+          <a:bodyPr numCol="1"/>
+          <a:lstStyle/>
+          <a:p>
+            <a:pPr lvl="1">
+              <a:lnSpc>
+                <a:spcPct val="100000"/>
+              </a:lnSpc>
+            </a:pPr>
+            <a:r>
+              <a:rPr lang="en-US" sz="2400" dirty="0"/>
+              <a:t>Revised Flow due to multiple views</a:t>
+            </a:r>
+          </a:p>
+          <a:p>
+            <a:pPr lvl="1">
+              <a:lnSpc>
+                <a:spcPct val="100000"/>
+              </a:lnSpc>
+            </a:pPr>
+            <a:r>
+              <a:rPr lang="en-US" sz="2400" dirty="0"/>
+              <a:t>New tree control for Add/Edit/Delete Entity</a:t>
+            </a:r>
+          </a:p>
+          <a:p>
+            <a:pPr lvl="2">
+              <a:lnSpc>
+                <a:spcPct val="100000"/>
+              </a:lnSpc>
+            </a:pPr>
+            <a:r>
+              <a:rPr lang="en-US" sz="2000" dirty="0"/>
+              <a:t>Tree shows hierarchical view</a:t>
+            </a:r>
+          </a:p>
+          <a:p>
+            <a:pPr lvl="1">
+              <a:lnSpc>
+                <a:spcPct val="100000"/>
+              </a:lnSpc>
+            </a:pPr>
+            <a:r>
+              <a:rPr lang="en-US" sz="2400" dirty="0"/>
+              <a:t>Right-Click tree or existing entity for actions</a:t>
+            </a:r>
+          </a:p>
+        </p:txBody>
+      </p:sp>
+      <p:pic>
+        <p:nvPicPr>
+          <p:cNvPr id="3" name="Picture 2">
+            <a:extLst>
+              <a:ext uri="{FF2B5EF4-FFF2-40B4-BE49-F238E27FC236}">
+                <a16:creationId xmlns:a16="http://schemas.microsoft.com/office/drawing/2014/main" id="{D5ED0589-CD0D-4151-B0A2-6F1C93E71EE6}"/>
+              </a:ext>
+            </a:extLst>
+          </p:cNvPr>
+          <p:cNvPicPr>
+            <a:picLocks noChangeAspect="1"/>
+          </p:cNvPicPr>
+          <p:nvPr/>
+        </p:nvPicPr>
+        <p:blipFill>
+          <a:blip r:embed="rId3"/>
+          <a:stretch>
+            <a:fillRect/>
+          </a:stretch>
+        </p:blipFill>
+        <p:spPr>
+          <a:xfrm>
+            <a:off x="4784095" y="1366944"/>
+            <a:ext cx="6920225" cy="4193858"/>
+          </a:xfrm>
+          <a:prstGeom prst="rect">
+            <a:avLst/>
+          </a:prstGeom>
+        </p:spPr>
+      </p:pic>
+    </p:spTree>
+    <p:extLst>
+      <p:ext uri="{BB962C8B-B14F-4D97-AF65-F5344CB8AC3E}">
+        <p14:creationId xmlns:p14="http://schemas.microsoft.com/office/powerpoint/2010/main" val="3756481654"/>
+      </p:ext>
+    </p:extLst>
+  </p:cSld>
+  <p:clrMapOvr>
+    <a:masterClrMapping/>
+  </p:clrMapOvr>
+</p:sld>
+</file>
+
+<file path=ppt/slides/slide7.xml><?xml version="1.0" encoding="utf-8"?>
+<p:sld xmlns:a="http://schemas.openxmlformats.org/drawingml/2006/main" xmlns:r="http://schemas.openxmlformats.org/officeDocument/2006/relationships" xmlns:p="http://schemas.openxmlformats.org/presentationml/2006/main">
+  <p:cSld>
+    <p:spTree>
+      <p:nvGrpSpPr>
+        <p:cNvPr id="1" name=""/>
+        <p:cNvGrpSpPr/>
+        <p:nvPr/>
+      </p:nvGrpSpPr>
+      <p:grpSpPr>
+        <a:xfrm>
+          <a:off x="0" y="0"/>
+          <a:ext cx="0" cy="0"/>
+          <a:chOff x="0" y="0"/>
+          <a:chExt cx="0" cy="0"/>
+        </a:xfrm>
+      </p:grpSpPr>
+      <p:sp>
+        <p:nvSpPr>
+          <p:cNvPr id="8" name="Title 7"/>
+          <p:cNvSpPr>
+            <a:spLocks noGrp="1"/>
+          </p:cNvSpPr>
+          <p:nvPr>
+            <p:ph type="title"/>
+          </p:nvPr>
+        </p:nvSpPr>
+        <p:spPr/>
+        <p:txBody>
+          <a:bodyPr/>
+          <a:lstStyle/>
+          <a:p>
+            <a:r>
+              <a:rPr lang="en-US" dirty="0"/>
+              <a:t>Code Generation Wizard</a:t>
+            </a:r>
+          </a:p>
+        </p:txBody>
+      </p:sp>
+      <p:sp>
+        <p:nvSpPr>
+          <p:cNvPr id="12" name="Content Placeholder 4"/>
+          <p:cNvSpPr>
+            <a:spLocks noGrp="1"/>
+          </p:cNvSpPr>
+          <p:nvPr>
+            <p:ph idx="1"/>
+          </p:nvPr>
+        </p:nvSpPr>
+        <p:spPr>
+          <a:xfrm>
+            <a:off x="466025" y="1366944"/>
+            <a:ext cx="3539047" cy="1915752"/>
+          </a:xfrm>
+        </p:spPr>
+        <p:txBody>
+          <a:bodyPr numCol="1"/>
+          <a:lstStyle/>
+          <a:p>
+            <a:pPr lvl="1"/>
+            <a:r>
+              <a:rPr lang="en-US" sz="2400" dirty="0"/>
+              <a:t>New Entity Tab for properties specific to the entity</a:t>
+            </a:r>
+          </a:p>
+          <a:p>
+            <a:pPr lvl="1"/>
+            <a:r>
+              <a:rPr lang="en-US" sz="2400" dirty="0"/>
+              <a:t>Save/Cancel to update tree</a:t>
+            </a:r>
+            <a:endParaRPr lang="en-US" dirty="0"/>
+          </a:p>
+        </p:txBody>
+      </p:sp>
+      <p:pic>
+        <p:nvPicPr>
+          <p:cNvPr id="5" name="Picture 4">
+            <a:extLst>
+              <a:ext uri="{FF2B5EF4-FFF2-40B4-BE49-F238E27FC236}">
+                <a16:creationId xmlns:a16="http://schemas.microsoft.com/office/drawing/2014/main" id="{4DB2AA2F-C24E-4F1A-AAB4-38668B00622F}"/>
+              </a:ext>
+            </a:extLst>
+          </p:cNvPr>
+          <p:cNvPicPr>
+            <a:picLocks noChangeAspect="1"/>
+          </p:cNvPicPr>
+          <p:nvPr/>
+        </p:nvPicPr>
+        <p:blipFill>
+          <a:blip r:embed="rId3"/>
+          <a:stretch>
+            <a:fillRect/>
+          </a:stretch>
+        </p:blipFill>
+        <p:spPr>
+          <a:xfrm>
+            <a:off x="4284092" y="1936348"/>
+            <a:ext cx="7441883" cy="4695063"/>
+          </a:xfrm>
+          <a:prstGeom prst="rect">
+            <a:avLst/>
+          </a:prstGeom>
+        </p:spPr>
+      </p:pic>
+    </p:spTree>
+    <p:extLst>
+      <p:ext uri="{BB962C8B-B14F-4D97-AF65-F5344CB8AC3E}">
+        <p14:creationId xmlns:p14="http://schemas.microsoft.com/office/powerpoint/2010/main" val="2478444265"/>
+      </p:ext>
+    </p:extLst>
+  </p:cSld>
+  <p:clrMapOvr>
+    <a:masterClrMapping/>
+  </p:clrMapOvr>
+</p:sld>
+</file>
+
 <file path=ppt/slides/slide8.xml><?xml version="1.0" encoding="utf-8"?>
 <p:sld xmlns:a="http://schemas.openxmlformats.org/drawingml/2006/main" xmlns:r="http://schemas.openxmlformats.org/officeDocument/2006/relationships" xmlns:p="http://schemas.openxmlformats.org/presentationml/2006/main">
   <p:cSld>
@@ -3773,7 +5928,7 @@
           <a:p>
             <a:r>
               <a:rPr lang="en-US" dirty="0"/>
-              <a:t> Customization Wizard</a:t>
+              <a:t>Code Generation Wizard</a:t>
             </a:r>
           </a:p>
         </p:txBody>
@@ -3791,7 +5946,7 @@
         <p:spPr>
           <a:xfrm>
             <a:off x="466025" y="1366944"/>
-            <a:ext cx="4332478" cy="5008456"/>
+            <a:ext cx="3539047" cy="1915752"/>
           </a:xfrm>
         </p:spPr>
         <p:txBody>
@@ -3801,19 +5956,53 @@
             <a:pPr lvl="1"/>
             <a:r>
               <a:rPr lang="en-US" sz="2400" dirty="0"/>
-              <a:t>Global Files Updated to 2018.1</a:t>
+              <a:t>New Options Tab for options for entity</a:t>
             </a:r>
           </a:p>
           <a:p>
             <a:pPr lvl="1"/>
-            <a:endParaRPr lang="en-US" sz="2400" dirty="0"/>
-          </a:p>
-        </p:txBody>
-      </p:sp>
+            <a:r>
+              <a:rPr lang="en-US" sz="2400" dirty="0"/>
+              <a:t>Save/Cancel to update tree</a:t>
+            </a:r>
+            <a:endParaRPr lang="en-US" dirty="0"/>
+          </a:p>
+        </p:txBody>
+      </p:sp>
+      <p:pic>
+        <p:nvPicPr>
+          <p:cNvPr id="2" name="Picture 1">
+            <a:extLst>
+              <a:ext uri="{FF2B5EF4-FFF2-40B4-BE49-F238E27FC236}">
+                <a16:creationId xmlns:a16="http://schemas.microsoft.com/office/drawing/2014/main" id="{AFCE2D65-4BB3-41B0-9567-E95718512042}"/>
+              </a:ext>
+            </a:extLst>
+          </p:cNvPr>
+          <p:cNvPicPr>
+            <a:picLocks noChangeAspect="1"/>
+          </p:cNvPicPr>
+          <p:nvPr/>
+        </p:nvPicPr>
+        <p:blipFill>
+          <a:blip r:embed="rId3"/>
+          <a:stretch>
+            <a:fillRect/>
+          </a:stretch>
+        </p:blipFill>
+        <p:spPr>
+          <a:xfrm>
+            <a:off x="4081665" y="1366944"/>
+            <a:ext cx="7644310" cy="5138631"/>
+          </a:xfrm>
+          <a:prstGeom prst="rect">
+            <a:avLst/>
+          </a:prstGeom>
+        </p:spPr>
+      </p:pic>
     </p:spTree>
     <p:extLst>
       <p:ext uri="{BB962C8B-B14F-4D97-AF65-F5344CB8AC3E}">
-        <p14:creationId xmlns:p14="http://schemas.microsoft.com/office/powerpoint/2010/main" val="1322763348"/>
+        <p14:creationId xmlns:p14="http://schemas.microsoft.com/office/powerpoint/2010/main" val="1441864642"/>
       </p:ext>
     </p:extLst>
   </p:cSld>
@@ -3857,7 +6046,7 @@
           <a:p>
             <a:r>
               <a:rPr lang="en-US" dirty="0"/>
-              <a:t>GitHub Repository</a:t>
+              <a:t>Code Generation Wizard</a:t>
             </a:r>
           </a:p>
         </p:txBody>
@@ -3875,7 +6064,7 @@
         <p:spPr>
           <a:xfrm>
             <a:off x="466025" y="1366944"/>
-            <a:ext cx="11231999" cy="5008456"/>
+            <a:ext cx="3539047" cy="1915752"/>
           </a:xfrm>
         </p:spPr>
         <p:txBody>
@@ -3885,71 +6074,53 @@
             <a:pPr lvl="1"/>
             <a:r>
               <a:rPr lang="en-US" sz="2400" dirty="0"/>
-              <a:t>Open Source</a:t>
-            </a:r>
-          </a:p>
-          <a:p>
-            <a:pPr lvl="2"/>
-            <a:r>
-              <a:rPr lang="en-US" sz="2000" dirty="0">
-                <a:hlinkClick r:id="rId3"/>
-              </a:rPr>
-              <a:t>https://github.com/SageNADev/Sage300-SDK</a:t>
-            </a:r>
-            <a:endParaRPr lang="en-US" sz="2000" dirty="0"/>
-          </a:p>
-          <a:p>
-            <a:pPr lvl="2"/>
-            <a:r>
-              <a:rPr lang="en-US" sz="2000" dirty="0"/>
-              <a:t>2018.1 is available in the “master” branch</a:t>
-            </a:r>
-          </a:p>
-          <a:p>
-            <a:pPr lvl="2"/>
-            <a:r>
-              <a:rPr lang="en-US" sz="2000" dirty="0"/>
-              <a:t>2018.0 is available in the “release-2018” branch (archive)</a:t>
-            </a:r>
-          </a:p>
-          <a:p>
-            <a:pPr lvl="2"/>
-            <a:r>
-              <a:rPr lang="en-US" sz="2000" dirty="0"/>
-              <a:t>2017.2 is available in the “release-2017.2” branch (archive)</a:t>
-            </a:r>
-          </a:p>
-          <a:p>
-            <a:pPr lvl="2"/>
-            <a:r>
-              <a:rPr lang="en-US" sz="2000" dirty="0"/>
-              <a:t>2017.1 is available in the “release-2017.1” branch (archive)</a:t>
-            </a:r>
-          </a:p>
-          <a:p>
-            <a:pPr lvl="2"/>
-            <a:r>
-              <a:rPr lang="en-US" sz="2000" dirty="0"/>
-              <a:t>2017 is available in the “release-2017” branch (archive)</a:t>
-            </a:r>
-          </a:p>
-          <a:p>
-            <a:pPr lvl="2"/>
-            <a:r>
-              <a:rPr lang="en-US" sz="2000" dirty="0"/>
-              <a:t>2018.2 is available in the “develop” branch (in-progress)</a:t>
-            </a:r>
-          </a:p>
-          <a:p>
-            <a:pPr lvl="2"/>
+              <a:t>New Properties Tab to Add/Modify/Delete properties before they are generated</a:t>
+            </a:r>
+          </a:p>
+          <a:p>
+            <a:pPr lvl="1"/>
+            <a:r>
+              <a:rPr lang="en-US" sz="2400" dirty="0"/>
+              <a:t>Save/Cancel to update tree</a:t>
+            </a:r>
             <a:endParaRPr lang="en-US" dirty="0"/>
           </a:p>
         </p:txBody>
       </p:sp>
+      <p:pic>
+        <p:nvPicPr>
+          <p:cNvPr id="3" name="Picture 2">
+            <a:extLst>
+              <a:ext uri="{FF2B5EF4-FFF2-40B4-BE49-F238E27FC236}">
+                <a16:creationId xmlns:a16="http://schemas.microsoft.com/office/drawing/2014/main" id="{E4F0355C-E0FC-4488-9F88-88BA006D09F8}"/>
+              </a:ext>
+            </a:extLst>
+          </p:cNvPr>
+          <p:cNvPicPr>
+            <a:picLocks noChangeAspect="1"/>
+          </p:cNvPicPr>
+          <p:nvPr/>
+        </p:nvPicPr>
+        <p:blipFill>
+          <a:blip r:embed="rId3"/>
+          <a:stretch>
+            <a:fillRect/>
+          </a:stretch>
+        </p:blipFill>
+        <p:spPr>
+          <a:xfrm>
+            <a:off x="4106989" y="1366944"/>
+            <a:ext cx="7624473" cy="5125296"/>
+          </a:xfrm>
+          <a:prstGeom prst="rect">
+            <a:avLst/>
+          </a:prstGeom>
+        </p:spPr>
+      </p:pic>
     </p:spTree>
     <p:extLst>
       <p:ext uri="{BB962C8B-B14F-4D97-AF65-F5344CB8AC3E}">
-        <p14:creationId xmlns:p14="http://schemas.microsoft.com/office/powerpoint/2010/main" val="1784428590"/>
+        <p14:creationId xmlns:p14="http://schemas.microsoft.com/office/powerpoint/2010/main" val="3525905437"/>
       </p:ext>
     </p:extLst>
   </p:cSld>

</xml_diff>

<commit_message>
2018.1 Added soe code maps
</commit_message>
<xml_diff>
--- a/docs/presentations/Sage300SDK_2018.1WebSDKOverview.pptx
+++ b/docs/presentations/Sage300SDK_2018.1WebSDKOverview.pptx
@@ -5,7 +5,7 @@
     <p:sldMasterId id="2147483660" r:id="rId1"/>
   </p:sldMasterIdLst>
   <p:notesMasterIdLst>
-    <p:notesMasterId r:id="rId19"/>
+    <p:notesMasterId r:id="rId20"/>
   </p:notesMasterIdLst>
   <p:sldIdLst>
     <p:sldId id="257" r:id="rId2"/>
@@ -23,8 +23,9 @@
     <p:sldId id="280" r:id="rId14"/>
     <p:sldId id="281" r:id="rId15"/>
     <p:sldId id="289" r:id="rId16"/>
-    <p:sldId id="290" r:id="rId17"/>
-    <p:sldId id="265" r:id="rId18"/>
+    <p:sldId id="291" r:id="rId17"/>
+    <p:sldId id="290" r:id="rId18"/>
+    <p:sldId id="265" r:id="rId19"/>
   </p:sldIdLst>
   <p:sldSz cx="12192000" cy="6858000"/>
   <p:notesSz cx="6858000" cy="9144000"/>
@@ -217,7 +218,7 @@
           <a:p>
             <a:fld id="{F8DE098C-C2B2-472C-9728-F51906A9149D}" type="datetimeFigureOut">
               <a:rPr lang="en-US" smtClean="0"/>
-              <a:t>11/15/2017</a:t>
+              <a:t>11/17/2017</a:t>
             </a:fld>
             <a:endParaRPr lang="en-US"/>
           </a:p>
@@ -1461,7 +1462,7 @@
     </p:spTree>
     <p:extLst>
       <p:ext uri="{BB962C8B-B14F-4D97-AF65-F5344CB8AC3E}">
-        <p14:creationId xmlns:p14="http://schemas.microsoft.com/office/powerpoint/2010/main" val="1183915067"/>
+        <p14:creationId xmlns:p14="http://schemas.microsoft.com/office/powerpoint/2010/main" val="1716275904"/>
       </p:ext>
     </p:extLst>
   </p:cSld>
@@ -1602,6 +1603,147 @@
     </p:spTree>
     <p:extLst>
       <p:ext uri="{BB962C8B-B14F-4D97-AF65-F5344CB8AC3E}">
+        <p14:creationId xmlns:p14="http://schemas.microsoft.com/office/powerpoint/2010/main" val="1183915067"/>
+      </p:ext>
+    </p:extLst>
+  </p:cSld>
+  <p:clrMapOvr>
+    <a:masterClrMapping/>
+  </p:clrMapOvr>
+</p:notes>
+</file>
+
+<file path=ppt/notesSlides/notesSlide17.xml><?xml version="1.0" encoding="utf-8"?>
+<p:notes xmlns:a="http://schemas.openxmlformats.org/drawingml/2006/main" xmlns:r="http://schemas.openxmlformats.org/officeDocument/2006/relationships" xmlns:p="http://schemas.openxmlformats.org/presentationml/2006/main">
+  <p:cSld>
+    <p:spTree>
+      <p:nvGrpSpPr>
+        <p:cNvPr id="1" name=""/>
+        <p:cNvGrpSpPr/>
+        <p:nvPr/>
+      </p:nvGrpSpPr>
+      <p:grpSpPr>
+        <a:xfrm>
+          <a:off x="0" y="0"/>
+          <a:ext cx="0" cy="0"/>
+          <a:chOff x="0" y="0"/>
+          <a:chExt cx="0" cy="0"/>
+        </a:xfrm>
+      </p:grpSpPr>
+      <p:sp>
+        <p:nvSpPr>
+          <p:cNvPr id="2" name="Slide Image Placeholder 1"/>
+          <p:cNvSpPr>
+            <a:spLocks noGrp="1" noRot="1" noChangeAspect="1"/>
+          </p:cNvSpPr>
+          <p:nvPr>
+            <p:ph type="sldImg"/>
+          </p:nvPr>
+        </p:nvSpPr>
+        <p:spPr/>
+      </p:sp>
+      <p:sp>
+        <p:nvSpPr>
+          <p:cNvPr id="3" name="Notes Placeholder 2"/>
+          <p:cNvSpPr>
+            <a:spLocks noGrp="1"/>
+          </p:cNvSpPr>
+          <p:nvPr>
+            <p:ph type="body" idx="1"/>
+          </p:nvPr>
+        </p:nvSpPr>
+        <p:spPr/>
+        <p:txBody>
+          <a:bodyPr/>
+          <a:lstStyle/>
+          <a:p>
+            <a:endParaRPr lang="en-US" dirty="0"/>
+          </a:p>
+          <a:p>
+            <a:endParaRPr lang="en-US" dirty="0"/>
+          </a:p>
+        </p:txBody>
+      </p:sp>
+      <p:sp>
+        <p:nvSpPr>
+          <p:cNvPr id="4" name="Slide Number Placeholder 3"/>
+          <p:cNvSpPr>
+            <a:spLocks noGrp="1"/>
+          </p:cNvSpPr>
+          <p:nvPr>
+            <p:ph type="sldNum" sz="quarter" idx="10"/>
+          </p:nvPr>
+        </p:nvSpPr>
+        <p:spPr/>
+        <p:txBody>
+          <a:bodyPr/>
+          <a:lstStyle/>
+          <a:p>
+            <a:pPr marL="0" marR="0" lvl="0" indent="0" defTabSz="914400" eaLnBrk="1" fontAlgn="auto" latinLnBrk="0" hangingPunct="1">
+              <a:lnSpc>
+                <a:spcPct val="100000"/>
+              </a:lnSpc>
+              <a:spcBef>
+                <a:spcPts val="0"/>
+              </a:spcBef>
+              <a:spcAft>
+                <a:spcPts val="0"/>
+              </a:spcAft>
+              <a:buClrTx/>
+              <a:buSzTx/>
+              <a:buFontTx/>
+              <a:buNone/>
+              <a:tabLst/>
+              <a:defRPr/>
+            </a:pPr>
+            <a:fld id="{AB69E77B-23F2-4D26-B3FA-6109AB5D8139}" type="slidenum">
+              <a:rPr kumimoji="0" lang="en-GB" sz="1800" b="0" i="0" u="none" strike="noStrike" kern="0" cap="none" spc="0" normalizeH="0" baseline="0" noProof="0" smtClean="0">
+                <a:ln>
+                  <a:noFill/>
+                </a:ln>
+                <a:solidFill>
+                  <a:prstClr val="black"/>
+                </a:solidFill>
+                <a:effectLst/>
+                <a:uLnTx/>
+                <a:uFillTx/>
+              </a:rPr>
+              <a:pPr marL="0" marR="0" lvl="0" indent="0" defTabSz="914400" eaLnBrk="1" fontAlgn="auto" latinLnBrk="0" hangingPunct="1">
+                <a:lnSpc>
+                  <a:spcPct val="100000"/>
+                </a:lnSpc>
+                <a:spcBef>
+                  <a:spcPts val="0"/>
+                </a:spcBef>
+                <a:spcAft>
+                  <a:spcPts val="0"/>
+                </a:spcAft>
+                <a:buClrTx/>
+                <a:buSzTx/>
+                <a:buFontTx/>
+                <a:buNone/>
+                <a:tabLst/>
+                <a:defRPr/>
+              </a:pPr>
+              <a:t>18</a:t>
+            </a:fld>
+            <a:endParaRPr kumimoji="0" lang="en-GB" sz="1800" b="0" i="0" u="none" strike="noStrike" kern="0" cap="none" spc="0" normalizeH="0" baseline="0" noProof="0">
+              <a:ln>
+                <a:noFill/>
+              </a:ln>
+              <a:solidFill>
+                <a:prstClr val="black"/>
+              </a:solidFill>
+              <a:effectLst/>
+              <a:uLnTx/>
+              <a:uFillTx/>
+            </a:endParaRPr>
+          </a:p>
+        </p:txBody>
+      </p:sp>
+    </p:spTree>
+    <p:extLst>
+      <p:ext uri="{BB962C8B-B14F-4D97-AF65-F5344CB8AC3E}">
         <p14:creationId xmlns:p14="http://schemas.microsoft.com/office/powerpoint/2010/main" val="250796128"/>
       </p:ext>
     </p:extLst>
@@ -2836,7 +2978,7 @@
                 </a:solidFill>
               </a:rPr>
               <a:pPr/>
-              <a:t>2017/11/15</a:t>
+              <a:t>2017/11/17</a:t>
             </a:fld>
             <a:endParaRPr lang="en-US">
               <a:solidFill>
@@ -3141,7 +3283,7 @@
                 </a:solidFill>
               </a:rPr>
               <a:pPr/>
-              <a:t>2017/11/15</a:t>
+              <a:t>2017/11/17</a:t>
             </a:fld>
             <a:endParaRPr lang="en-US">
               <a:solidFill>
@@ -3378,7 +3520,7 @@
             <a:fld id="{EE1C84F4-270C-2249-89D9-A705BDADDAAB}" type="datetime1">
               <a:rPr lang="en-ZA" smtClean="0"/>
               <a:pPr/>
-              <a:t>2017/11/15</a:t>
+              <a:t>2017/11/17</a:t>
             </a:fld>
             <a:endParaRPr lang="en-US"/>
           </a:p>
@@ -3717,7 +3859,7 @@
             <a:fld id="{2AE6851E-022E-D141-8BE0-1745E9557F71}" type="datetime1">
               <a:rPr lang="en-ZA" smtClean="0"/>
               <a:pPr/>
-              <a:t>2017/11/15</a:t>
+              <a:t>2017/11/17</a:t>
             </a:fld>
             <a:endParaRPr lang="en-US"/>
           </a:p>
@@ -5017,6 +5159,165 @@
           <a:p>
             <a:r>
               <a:rPr lang="en-US" dirty="0"/>
+              <a:t> Code Maps</a:t>
+            </a:r>
+          </a:p>
+        </p:txBody>
+      </p:sp>
+      <p:sp>
+        <p:nvSpPr>
+          <p:cNvPr id="12" name="Content Placeholder 4"/>
+          <p:cNvSpPr>
+            <a:spLocks noGrp="1"/>
+          </p:cNvSpPr>
+          <p:nvPr>
+            <p:ph idx="1"/>
+          </p:nvPr>
+        </p:nvSpPr>
+        <p:spPr>
+          <a:xfrm>
+            <a:off x="466024" y="1366944"/>
+            <a:ext cx="3995579" cy="5008456"/>
+          </a:xfrm>
+        </p:spPr>
+        <p:txBody>
+          <a:bodyPr numCol="1"/>
+          <a:lstStyle/>
+          <a:p>
+            <a:pPr lvl="1"/>
+            <a:r>
+              <a:rPr lang="en-US" sz="2400" dirty="0"/>
+              <a:t>New for 2018.1!</a:t>
+            </a:r>
+          </a:p>
+          <a:p>
+            <a:pPr lvl="1"/>
+            <a:r>
+              <a:rPr lang="en-US" sz="2400" dirty="0"/>
+              <a:t>Visual Studio Code Maps</a:t>
+            </a:r>
+          </a:p>
+          <a:p>
+            <a:pPr lvl="1"/>
+            <a:r>
+              <a:rPr lang="en-US" sz="2400" dirty="0"/>
+              <a:t>Visual graph of relationships</a:t>
+            </a:r>
+          </a:p>
+          <a:p>
+            <a:pPr lvl="1"/>
+            <a:r>
+              <a:rPr lang="en-US" sz="2400" dirty="0"/>
+              <a:t>Locate in the maps folder</a:t>
+            </a:r>
+          </a:p>
+          <a:p>
+            <a:pPr lvl="2"/>
+            <a:r>
+              <a:rPr lang="en-US" sz="2000" dirty="0"/>
+              <a:t>Specific Entities</a:t>
+            </a:r>
+          </a:p>
+          <a:p>
+            <a:pPr lvl="2"/>
+            <a:r>
+              <a:rPr lang="en-US" sz="2000" dirty="0"/>
+              <a:t>Specific Controllers</a:t>
+            </a:r>
+          </a:p>
+          <a:p>
+            <a:pPr lvl="2"/>
+            <a:r>
+              <a:rPr lang="en-US" sz="2000" dirty="0"/>
+              <a:t>Utilities</a:t>
+            </a:r>
+          </a:p>
+          <a:p>
+            <a:pPr lvl="2"/>
+            <a:r>
+              <a:rPr lang="en-US" sz="2000" dirty="0"/>
+              <a:t>Helper Classes</a:t>
+            </a:r>
+          </a:p>
+        </p:txBody>
+      </p:sp>
+      <p:pic>
+        <p:nvPicPr>
+          <p:cNvPr id="3" name="Picture 2">
+            <a:extLst>
+              <a:ext uri="{FF2B5EF4-FFF2-40B4-BE49-F238E27FC236}">
+                <a16:creationId xmlns:a16="http://schemas.microsoft.com/office/drawing/2014/main" id="{93EBE716-CD6F-46B3-91D5-9C33E7894FED}"/>
+              </a:ext>
+            </a:extLst>
+          </p:cNvPr>
+          <p:cNvPicPr>
+            <a:picLocks noChangeAspect="1"/>
+          </p:cNvPicPr>
+          <p:nvPr/>
+        </p:nvPicPr>
+        <p:blipFill>
+          <a:blip r:embed="rId3"/>
+          <a:stretch>
+            <a:fillRect/>
+          </a:stretch>
+        </p:blipFill>
+        <p:spPr>
+          <a:xfrm>
+            <a:off x="4641486" y="1089989"/>
+            <a:ext cx="7388938" cy="5562366"/>
+          </a:xfrm>
+          <a:prstGeom prst="rect">
+            <a:avLst/>
+          </a:prstGeom>
+        </p:spPr>
+      </p:pic>
+    </p:spTree>
+    <p:extLst>
+      <p:ext uri="{BB962C8B-B14F-4D97-AF65-F5344CB8AC3E}">
+        <p14:creationId xmlns:p14="http://schemas.microsoft.com/office/powerpoint/2010/main" val="1011377933"/>
+      </p:ext>
+    </p:extLst>
+  </p:cSld>
+  <p:clrMapOvr>
+    <a:masterClrMapping/>
+  </p:clrMapOvr>
+</p:sld>
+</file>
+
+<file path=ppt/slides/slide17.xml><?xml version="1.0" encoding="utf-8"?>
+<p:sld xmlns:a="http://schemas.openxmlformats.org/drawingml/2006/main" xmlns:r="http://schemas.openxmlformats.org/officeDocument/2006/relationships" xmlns:p="http://schemas.openxmlformats.org/presentationml/2006/main">
+  <p:cSld>
+    <p:spTree>
+      <p:nvGrpSpPr>
+        <p:cNvPr id="1" name=""/>
+        <p:cNvGrpSpPr/>
+        <p:nvPr/>
+      </p:nvGrpSpPr>
+      <p:grpSpPr>
+        <a:xfrm>
+          <a:off x="0" y="0"/>
+          <a:ext cx="0" cy="0"/>
+          <a:chOff x="0" y="0"/>
+          <a:chExt cx="0" cy="0"/>
+        </a:xfrm>
+      </p:grpSpPr>
+      <p:sp>
+        <p:nvSpPr>
+          <p:cNvPr id="8" name="Title 7"/>
+          <p:cNvSpPr>
+            <a:spLocks noGrp="1"/>
+          </p:cNvSpPr>
+          <p:nvPr>
+            <p:ph type="title"/>
+          </p:nvPr>
+        </p:nvSpPr>
+        <p:spPr/>
+        <p:txBody>
+          <a:bodyPr/>
+          <a:lstStyle/>
+          <a:p>
+            <a:r>
+              <a:rPr lang="en-US" dirty="0"/>
               <a:t> Web API</a:t>
             </a:r>
           </a:p>
@@ -5064,7 +5365,7 @@
 </p:sld>
 </file>
 
-<file path=ppt/slides/slide17.xml><?xml version="1.0" encoding="utf-8"?>
+<file path=ppt/slides/slide18.xml><?xml version="1.0" encoding="utf-8"?>
 <p:sld xmlns:a="http://schemas.openxmlformats.org/drawingml/2006/main" xmlns:r="http://schemas.openxmlformats.org/officeDocument/2006/relationships" xmlns:p="http://schemas.openxmlformats.org/presentationml/2006/main">
   <p:cSld>
     <p:spTree>

</xml_diff>